<commit_message>
mofications due to discussion with EC Smart Appliances project
</commit_message>
<xml_diff>
--- a/proposals/Data Model Mapping to SDT, example Echonet Washing Machine.pptx
+++ b/proposals/Data Model Mapping to SDT, example Echonet Washing Machine.pptx
@@ -5,15 +5,16 @@
     <p:sldMasterId id="2147483648" r:id="rId1"/>
   </p:sldMasterIdLst>
   <p:notesMasterIdLst>
-    <p:notesMasterId r:id="rId8"/>
+    <p:notesMasterId r:id="rId9"/>
   </p:notesMasterIdLst>
   <p:sldIdLst>
     <p:sldId id="256" r:id="rId2"/>
     <p:sldId id="326" r:id="rId3"/>
     <p:sldId id="321" r:id="rId4"/>
     <p:sldId id="314" r:id="rId5"/>
-    <p:sldId id="324" r:id="rId6"/>
-    <p:sldId id="317" r:id="rId7"/>
+    <p:sldId id="327" r:id="rId6"/>
+    <p:sldId id="324" r:id="rId7"/>
+    <p:sldId id="317" r:id="rId8"/>
   </p:sldIdLst>
   <p:sldSz cx="9144000" cy="6858000" type="screen4x3"/>
   <p:notesSz cx="6858000" cy="9144000"/>
@@ -197,7 +198,7 @@
           <a:p>
             <a:fld id="{47C1448C-E773-4542-8F53-CF1B6EC1C902}" type="datetimeFigureOut">
               <a:rPr lang="de-DE" smtClean="0"/>
-              <a:t>09/12/14</a:t>
+              <a:t>06/01/15</a:t>
             </a:fld>
             <a:endParaRPr lang="de-DE"/>
           </a:p>
@@ -704,7 +705,7 @@
           <a:p>
             <a:fld id="{269B8615-4FB8-5046-9A04-F7FA71D771F9}" type="datetimeFigureOut">
               <a:rPr lang="de-DE" smtClean="0"/>
-              <a:t>09/12/14</a:t>
+              <a:t>06/01/15</a:t>
             </a:fld>
             <a:endParaRPr lang="de-DE"/>
           </a:p>
@@ -3933,7 +3934,7 @@
           <a:p>
             <a:fld id="{269B8615-4FB8-5046-9A04-F7FA71D771F9}" type="datetimeFigureOut">
               <a:rPr lang="en-US" noProof="0" smtClean="0"/>
-              <a:t>09/12/14</a:t>
+              <a:t>06/01/15</a:t>
             </a:fld>
             <a:endParaRPr lang="en-US" noProof="0" dirty="0"/>
           </a:p>
@@ -4467,11 +4468,7 @@
           <a:p>
             <a:r>
               <a:rPr lang="en-US" dirty="0" smtClean="0"/>
-              <a:t>Intended </a:t>
-            </a:r>
-            <a:r>
-              <a:rPr lang="en-US" dirty="0" smtClean="0"/>
-              <a:t>for: SHTF</a:t>
+              <a:t>Intended for: SHTF</a:t>
             </a:r>
           </a:p>
           <a:p>
@@ -4479,7 +4476,6 @@
               <a:rPr lang="en-US" dirty="0" smtClean="0"/>
               <a:t>Dec 9, 2014</a:t>
             </a:r>
-            <a:endParaRPr lang="en-US" dirty="0" smtClean="0"/>
           </a:p>
         </p:txBody>
       </p:sp>
@@ -4705,7 +4701,32 @@
           <a:p>
             <a:r>
               <a:rPr lang="en-US" dirty="0" smtClean="0"/>
-              <a:t>Show another example to use the SDT</a:t>
+              <a:t>Show another example to use the </a:t>
+            </a:r>
+            <a:r>
+              <a:rPr lang="en-US" dirty="0" smtClean="0"/>
+              <a:t>SDT</a:t>
+            </a:r>
+          </a:p>
+          <a:p>
+            <a:r>
+              <a:rPr lang="en-US" dirty="0" smtClean="0"/>
+              <a:t>Change 2015-01-06:</a:t>
+            </a:r>
+          </a:p>
+          <a:p>
+            <a:pPr lvl="1"/>
+            <a:r>
+              <a:rPr lang="en-US" dirty="0" smtClean="0"/>
+              <a:t>Included documentation in </a:t>
+            </a:r>
+            <a:r>
+              <a:rPr lang="en-US" smtClean="0"/>
+              <a:t>SDT translation as </a:t>
+            </a:r>
+            <a:r>
+              <a:rPr lang="en-US" dirty="0" smtClean="0"/>
+              <a:t>discussed</a:t>
             </a:r>
             <a:endParaRPr lang="en-US" dirty="0"/>
           </a:p>
@@ -4886,7 +4907,11 @@
           <a:p>
             <a:r>
               <a:rPr lang="en-CA" altLang="en-US" sz="3600" dirty="0" smtClean="0"/>
-              <a:t>Translation to SDT</a:t>
+              <a:t>Translation to </a:t>
+            </a:r>
+            <a:r>
+              <a:rPr lang="en-CA" altLang="en-US" sz="3600" dirty="0" smtClean="0"/>
+              <a:t>SDT (1/2)</a:t>
             </a:r>
             <a:endParaRPr lang="en-CA" altLang="en-US" sz="3600" dirty="0" smtClean="0"/>
           </a:p>
@@ -4903,9 +4928,9 @@
         <p:grpSpPr bwMode="auto">
           <a:xfrm>
             <a:off x="457201" y="1243460"/>
-            <a:ext cx="8229600" cy="2952293"/>
+            <a:ext cx="8229600" cy="4798951"/>
             <a:chOff x="-2743199" y="-766980"/>
-            <a:chExt cx="8229600" cy="2952533"/>
+            <a:chExt cx="8229600" cy="4799341"/>
           </a:xfrm>
         </p:grpSpPr>
         <p:sp>
@@ -4919,7 +4944,7 @@
           <p:spPr bwMode="auto">
             <a:xfrm>
               <a:off x="-2743199" y="-492321"/>
-              <a:ext cx="8229600" cy="2677874"/>
+              <a:ext cx="8229600" cy="4524682"/>
             </a:xfrm>
             <a:prstGeom prst="rect">
               <a:avLst/>
@@ -5136,17 +5161,7 @@
                   <a:latin typeface="Courier" charset="0"/>
                   <a:cs typeface="Courier" charset="0"/>
                 </a:rPr>
-                <a:t>=</a:t>
-              </a:r>
-              <a:r>
-                <a:rPr lang="en-US" sz="1200" dirty="0" smtClean="0">
-                  <a:solidFill>
-                    <a:schemeClr val="tx1"/>
-                  </a:solidFill>
-                  <a:latin typeface="Courier" charset="0"/>
-                  <a:cs typeface="Courier" charset="0"/>
-                </a:rPr>
-                <a:t>”</a:t>
+                <a:t>=”</a:t>
               </a:r>
               <a:r>
                 <a:rPr lang="en-US" sz="1200" dirty="0" err="1" smtClean="0">
@@ -5166,17 +5181,7 @@
                   <a:latin typeface="Courier" charset="0"/>
                   <a:cs typeface="Courier" charset="0"/>
                 </a:rPr>
-                <a:t>"</a:t>
-              </a:r>
-              <a:r>
-                <a:rPr lang="en-US" sz="1200" dirty="0" smtClean="0">
-                  <a:solidFill>
-                    <a:schemeClr val="tx1"/>
-                  </a:solidFill>
-                  <a:latin typeface="Courier" charset="0"/>
-                  <a:cs typeface="Courier" charset="0"/>
-                </a:rPr>
-                <a:t>&gt;</a:t>
+                <a:t>"&gt;</a:t>
               </a:r>
             </a:p>
             <a:p>
@@ -5292,7 +5297,17 @@
                   <a:latin typeface="Courier" charset="0"/>
                   <a:cs typeface="Courier" charset="0"/>
                 </a:rPr>
-                <a:t>type=“</a:t>
+                <a:t>type=</a:t>
+              </a:r>
+              <a:r>
+                <a:rPr lang="en-US" sz="1200" dirty="0" smtClean="0">
+                  <a:solidFill>
+                    <a:schemeClr val="tx1"/>
+                  </a:solidFill>
+                  <a:latin typeface="Courier" charset="0"/>
+                  <a:cs typeface="Courier" charset="0"/>
+                </a:rPr>
+                <a:t>“</a:t>
               </a:r>
               <a:r>
                 <a:rPr lang="en-US" sz="1200" b="1" dirty="0" err="1" smtClean="0">
@@ -5342,12 +5357,22 @@
                   <a:latin typeface="Courier" charset="0"/>
                   <a:cs typeface="Courier" charset="0"/>
                 </a:rPr>
-                <a:t>” /&gt;</a:t>
+                <a:t>”&gt;</a:t>
               </a:r>
             </a:p>
             <a:p>
               <a:pPr eaLnBrk="1" hangingPunct="1"/>
               <a:r>
+                <a:rPr lang="en-US" sz="1200" dirty="0" smtClean="0">
+                  <a:solidFill>
+                    <a:schemeClr val="tx1"/>
+                  </a:solidFill>
+                  <a:latin typeface="Courier" charset="0"/>
+                  <a:cs typeface="Courier" charset="0"/>
+                </a:rPr>
+                <a:t>        &lt;</a:t>
+              </a:r>
+              <a:r>
                 <a:rPr lang="en-US" sz="1200" dirty="0">
                   <a:solidFill>
                     <a:schemeClr val="tx1"/>
@@ -5355,117 +5380,7 @@
                   <a:latin typeface="Courier" charset="0"/>
                   <a:cs typeface="Courier" charset="0"/>
                 </a:rPr>
-                <a:t>  </a:t>
-              </a:r>
-              <a:r>
-                <a:rPr lang="en-US" sz="1200" dirty="0" smtClean="0">
-                  <a:solidFill>
-                    <a:schemeClr val="tx1"/>
-                  </a:solidFill>
-                  <a:latin typeface="Courier" charset="0"/>
-                  <a:cs typeface="Courier" charset="0"/>
-                </a:rPr>
-                <a:t>    &lt;</a:t>
-              </a:r>
-              <a:r>
-                <a:rPr lang="en-US" sz="1200" dirty="0" err="1">
-                  <a:solidFill>
-                    <a:schemeClr val="tx1"/>
-                  </a:solidFill>
-                  <a:latin typeface="Courier" charset="0"/>
-                  <a:cs typeface="Courier" charset="0"/>
-                </a:rPr>
-                <a:t>DataPoint</a:t>
-              </a:r>
-              <a:r>
-                <a:rPr lang="en-US" sz="1200" dirty="0">
-                  <a:solidFill>
-                    <a:schemeClr val="tx1"/>
-                  </a:solidFill>
-                  <a:latin typeface="Courier" charset="0"/>
-                  <a:cs typeface="Courier" charset="0"/>
-                </a:rPr>
-                <a:t> name=</a:t>
-              </a:r>
-              <a:r>
-                <a:rPr lang="en-US" sz="1200" dirty="0" smtClean="0">
-                  <a:solidFill>
-                    <a:schemeClr val="tx1"/>
-                  </a:solidFill>
-                  <a:latin typeface="Courier" charset="0"/>
-                  <a:cs typeface="Courier" charset="0"/>
-                </a:rPr>
-                <a:t>“</a:t>
-              </a:r>
-              <a:r>
-                <a:rPr lang="en-US" sz="1200" b="1" dirty="0" err="1" smtClean="0">
-                  <a:solidFill>
-                    <a:schemeClr val="tx1"/>
-                  </a:solidFill>
-                  <a:latin typeface="Courier" charset="0"/>
-                  <a:cs typeface="Courier" charset="0"/>
-                </a:rPr>
-                <a:t>doorCoverOpenClose</a:t>
-              </a:r>
-              <a:r>
-                <a:rPr lang="en-US" sz="1200" b="1" dirty="0" err="1" smtClean="0">
-                  <a:solidFill>
-                    <a:schemeClr val="tx1"/>
-                  </a:solidFill>
-                  <a:latin typeface="Courier" charset="0"/>
-                  <a:cs typeface="Courier" charset="0"/>
-                </a:rPr>
-                <a:t>Status</a:t>
-              </a:r>
-              <a:r>
-                <a:rPr lang="en-US" sz="1200" dirty="0" smtClean="0">
-                  <a:solidFill>
-                    <a:schemeClr val="tx1"/>
-                  </a:solidFill>
-                  <a:latin typeface="Courier" charset="0"/>
-                  <a:cs typeface="Courier" charset="0"/>
-                </a:rPr>
-                <a:t>” </a:t>
-              </a:r>
-              <a:r>
-                <a:rPr lang="en-US" sz="1200" dirty="0">
-                  <a:solidFill>
-                    <a:schemeClr val="tx1"/>
-                  </a:solidFill>
-                  <a:latin typeface="Courier" charset="0"/>
-                  <a:cs typeface="Courier" charset="0"/>
-                </a:rPr>
-                <a:t>type=</a:t>
-              </a:r>
-              <a:r>
-                <a:rPr lang="en-US" sz="1200" dirty="0" smtClean="0">
-                  <a:solidFill>
-                    <a:schemeClr val="tx1"/>
-                  </a:solidFill>
-                  <a:latin typeface="Courier" charset="0"/>
-                  <a:cs typeface="Courier" charset="0"/>
-                </a:rPr>
-                <a:t>“</a:t>
-              </a:r>
-              <a:r>
-                <a:rPr lang="en-US" sz="1200" b="1" dirty="0" err="1" smtClean="0">
-                  <a:solidFill>
-                    <a:schemeClr val="tx1"/>
-                  </a:solidFill>
-                  <a:latin typeface="Courier" charset="0"/>
-                  <a:cs typeface="Courier" charset="0"/>
-                </a:rPr>
-                <a:t>boolean</a:t>
-              </a:r>
-              <a:r>
-                <a:rPr lang="en-US" sz="1200" dirty="0" smtClean="0">
-                  <a:solidFill>
-                    <a:schemeClr val="tx1"/>
-                  </a:solidFill>
-                  <a:latin typeface="Courier" charset="0"/>
-                  <a:cs typeface="Courier" charset="0"/>
-                </a:rPr>
-                <a:t>” /</a:t>
+                <a:t>Doc</a:t>
               </a:r>
               <a:r>
                 <a:rPr lang="en-US" sz="1200" dirty="0" smtClean="0">
@@ -5498,17 +5413,7 @@
                   <a:latin typeface="Courier" charset="0"/>
                   <a:cs typeface="Courier" charset="0"/>
                 </a:rPr>
-                <a:t>     &lt;</a:t>
-              </a:r>
-              <a:r>
-                <a:rPr lang="en-US" sz="1200" dirty="0" err="1">
-                  <a:solidFill>
-                    <a:schemeClr val="tx1"/>
-                  </a:solidFill>
-                  <a:latin typeface="Courier" charset="0"/>
-                  <a:cs typeface="Courier" charset="0"/>
-                </a:rPr>
-                <a:t>DataPoint</a:t>
+                <a:t>         Indicates </a:t>
               </a:r>
               <a:r>
                 <a:rPr lang="en-US" sz="1200" dirty="0">
@@ -5518,107 +5423,17 @@
                   <a:latin typeface="Courier" charset="0"/>
                   <a:cs typeface="Courier" charset="0"/>
                 </a:rPr>
-                <a:t> name=</a:t>
-              </a:r>
-              <a:r>
-                <a:rPr lang="en-US" sz="1200" dirty="0" smtClean="0">
-                  <a:solidFill>
-                    <a:schemeClr val="tx1"/>
-                  </a:solidFill>
-                  <a:latin typeface="Courier" charset="0"/>
-                  <a:cs typeface="Courier" charset="0"/>
-                </a:rPr>
-                <a:t>“</a:t>
-              </a:r>
-              <a:r>
-                <a:rPr lang="en-US" sz="1200" b="1" dirty="0" err="1" smtClean="0">
-                  <a:solidFill>
-                    <a:schemeClr val="tx1"/>
-                  </a:solidFill>
-                  <a:latin typeface="Courier" charset="0"/>
-                  <a:cs typeface="Courier" charset="0"/>
-                </a:rPr>
-                <a:t>washingMachineSetting</a:t>
-              </a:r>
-              <a:r>
-                <a:rPr lang="en-US" sz="1200" dirty="0" smtClean="0">
-                  <a:solidFill>
-                    <a:schemeClr val="tx1"/>
-                  </a:solidFill>
-                  <a:latin typeface="Courier" charset="0"/>
-                  <a:cs typeface="Courier" charset="0"/>
-                </a:rPr>
-                <a:t>” </a:t>
-              </a:r>
-              <a:r>
-                <a:rPr lang="en-US" sz="1200" dirty="0">
-                  <a:solidFill>
-                    <a:schemeClr val="tx1"/>
-                  </a:solidFill>
-                  <a:latin typeface="Courier" charset="0"/>
-                  <a:cs typeface="Courier" charset="0"/>
-                </a:rPr>
-                <a:t>type=</a:t>
-              </a:r>
-              <a:r>
-                <a:rPr lang="en-US" sz="1200" dirty="0" smtClean="0">
-                  <a:solidFill>
-                    <a:schemeClr val="tx1"/>
-                  </a:solidFill>
-                  <a:latin typeface="Courier" charset="0"/>
-                  <a:cs typeface="Courier" charset="0"/>
-                </a:rPr>
-                <a:t>“</a:t>
-              </a:r>
-              <a:r>
-                <a:rPr lang="en-US" sz="1200" b="1" dirty="0" smtClean="0">
-                  <a:solidFill>
-                    <a:schemeClr val="tx1"/>
-                  </a:solidFill>
-                  <a:latin typeface="Courier" charset="0"/>
-                  <a:cs typeface="Courier" charset="0"/>
-                </a:rPr>
-                <a:t>integer</a:t>
-              </a:r>
-              <a:r>
-                <a:rPr lang="en-US" sz="1200" dirty="0">
-                  <a:solidFill>
-                    <a:schemeClr val="tx1"/>
-                  </a:solidFill>
-                  <a:latin typeface="Courier" charset="0"/>
-                  <a:cs typeface="Courier" charset="0"/>
-                </a:rPr>
-                <a:t>” writable=“</a:t>
-              </a:r>
-              <a:r>
-                <a:rPr lang="en-US" sz="1200" b="1" dirty="0">
-                  <a:solidFill>
-                    <a:schemeClr val="tx1"/>
-                  </a:solidFill>
-                  <a:latin typeface="Courier" charset="0"/>
-                  <a:cs typeface="Courier" charset="0"/>
-                </a:rPr>
-                <a:t>true</a:t>
-              </a:r>
-              <a:r>
-                <a:rPr lang="en-US" sz="1200" dirty="0">
-                  <a:solidFill>
-                    <a:schemeClr val="tx1"/>
-                  </a:solidFill>
-                  <a:latin typeface="Courier" charset="0"/>
-                  <a:cs typeface="Courier" charset="0"/>
-                </a:rPr>
-                <a:t>” /</a:t>
-              </a:r>
-              <a:r>
-                <a:rPr lang="en-US" sz="1200" dirty="0" smtClean="0">
-                  <a:solidFill>
-                    <a:schemeClr val="tx1"/>
-                  </a:solidFill>
-                  <a:latin typeface="Courier" charset="0"/>
-                  <a:cs typeface="Courier" charset="0"/>
-                </a:rPr>
-                <a:t>&gt;</a:t>
+                <a:t>the ON/OFF </a:t>
+              </a:r>
+              <a:r>
+                <a:rPr lang="en-US" sz="1200" dirty="0" smtClean="0">
+                  <a:solidFill>
+                    <a:schemeClr val="tx1"/>
+                  </a:solidFill>
+                  <a:latin typeface="Courier" charset="0"/>
+                  <a:cs typeface="Courier" charset="0"/>
+                </a:rPr>
+                <a:t>status.</a:t>
               </a:r>
             </a:p>
             <a:p>
@@ -5641,97 +5456,7 @@
                   <a:latin typeface="Courier" charset="0"/>
                   <a:cs typeface="Courier" charset="0"/>
                 </a:rPr>
-                <a:t>     &lt;</a:t>
-              </a:r>
-              <a:r>
-                <a:rPr lang="en-US" sz="1200" dirty="0" err="1">
-                  <a:solidFill>
-                    <a:schemeClr val="tx1"/>
-                  </a:solidFill>
-                  <a:latin typeface="Courier" charset="0"/>
-                  <a:cs typeface="Courier" charset="0"/>
-                </a:rPr>
-                <a:t>DataPoint</a:t>
-              </a:r>
-              <a:r>
-                <a:rPr lang="en-US" sz="1200" dirty="0">
-                  <a:solidFill>
-                    <a:schemeClr val="tx1"/>
-                  </a:solidFill>
-                  <a:latin typeface="Courier" charset="0"/>
-                  <a:cs typeface="Courier" charset="0"/>
-                </a:rPr>
-                <a:t> name=</a:t>
-              </a:r>
-              <a:r>
-                <a:rPr lang="en-US" sz="1200" dirty="0" smtClean="0">
-                  <a:solidFill>
-                    <a:schemeClr val="tx1"/>
-                  </a:solidFill>
-                  <a:latin typeface="Courier" charset="0"/>
-                  <a:cs typeface="Courier" charset="0"/>
-                </a:rPr>
-                <a:t>“</a:t>
-              </a:r>
-              <a:r>
-                <a:rPr lang="en-US" sz="1200" b="1" dirty="0" err="1" smtClean="0">
-                  <a:solidFill>
-                    <a:schemeClr val="tx1"/>
-                  </a:solidFill>
-                  <a:latin typeface="Courier" charset="0"/>
-                  <a:cs typeface="Courier" charset="0"/>
-                </a:rPr>
-                <a:t>currentStageOfWashingCycle</a:t>
-              </a:r>
-              <a:r>
-                <a:rPr lang="en-US" sz="1200" dirty="0" smtClean="0">
-                  <a:solidFill>
-                    <a:schemeClr val="tx1"/>
-                  </a:solidFill>
-                  <a:latin typeface="Courier" charset="0"/>
-                  <a:cs typeface="Courier" charset="0"/>
-                </a:rPr>
-                <a:t>” </a:t>
-              </a:r>
-              <a:r>
-                <a:rPr lang="en-US" sz="1200" dirty="0">
-                  <a:solidFill>
-                    <a:schemeClr val="tx1"/>
-                  </a:solidFill>
-                  <a:latin typeface="Courier" charset="0"/>
-                  <a:cs typeface="Courier" charset="0"/>
-                </a:rPr>
-                <a:t>type=“</a:t>
-              </a:r>
-              <a:r>
-                <a:rPr lang="en-US" sz="1200" b="1" dirty="0">
-                  <a:solidFill>
-                    <a:schemeClr val="tx1"/>
-                  </a:solidFill>
-                  <a:latin typeface="Courier" charset="0"/>
-                  <a:cs typeface="Courier" charset="0"/>
-                </a:rPr>
-                <a:t>integer</a:t>
-              </a:r>
-              <a:r>
-                <a:rPr lang="en-US" sz="1200" dirty="0">
-                  <a:solidFill>
-                    <a:schemeClr val="tx1"/>
-                  </a:solidFill>
-                  <a:latin typeface="Courier" charset="0"/>
-                  <a:cs typeface="Courier" charset="0"/>
-                </a:rPr>
-                <a:t>” /</a:t>
-              </a:r>
-              <a:r>
-                <a:rPr lang="en-US" sz="1200" dirty="0" smtClean="0">
-                  <a:solidFill>
-                    <a:schemeClr val="tx1"/>
-                  </a:solidFill>
-                  <a:latin typeface="Courier" charset="0"/>
-                  <a:cs typeface="Courier" charset="0"/>
-                </a:rPr>
-                <a:t>&gt;</a:t>
+                <a:t>       &lt;/Doc&gt;</a:t>
               </a:r>
             </a:p>
             <a:p>
@@ -5744,20 +5469,20 @@
                   <a:latin typeface="Courier" charset="0"/>
                   <a:cs typeface="Courier" charset="0"/>
                 </a:rPr>
-                <a:t> </a:t>
-              </a:r>
-              <a:r>
-                <a:rPr lang="en-US" sz="1200" dirty="0" smtClean="0">
-                  <a:solidFill>
-                    <a:schemeClr val="tx1"/>
-                  </a:solidFill>
-                  <a:latin typeface="Courier" charset="0"/>
-                  <a:cs typeface="Courier" charset="0"/>
-                </a:rPr>
-                <a:t>     &lt;</a:t>
-              </a:r>
-              <a:r>
-                <a:rPr lang="en-US" sz="1200" dirty="0" err="1">
+                <a:t>	</a:t>
+              </a:r>
+              <a:r>
+                <a:rPr lang="en-US" sz="1200" dirty="0" smtClean="0">
+                  <a:solidFill>
+                    <a:schemeClr val="tx1"/>
+                  </a:solidFill>
+                  <a:latin typeface="Courier" charset="0"/>
+                  <a:cs typeface="Courier" charset="0"/>
+                </a:rPr>
+                <a:t> &lt;/</a:t>
+              </a:r>
+              <a:r>
+                <a:rPr lang="en-US" sz="1200" dirty="0" err="1" smtClean="0">
                   <a:solidFill>
                     <a:schemeClr val="tx1"/>
                   </a:solidFill>
@@ -5767,87 +5492,7 @@
                 <a:t>DataPoint</a:t>
               </a:r>
               <a:r>
-                <a:rPr lang="en-US" sz="1200" dirty="0">
-                  <a:solidFill>
-                    <a:schemeClr val="tx1"/>
-                  </a:solidFill>
-                  <a:latin typeface="Courier" charset="0"/>
-                  <a:cs typeface="Courier" charset="0"/>
-                </a:rPr>
-                <a:t> name=</a:t>
-              </a:r>
-              <a:r>
-                <a:rPr lang="en-US" sz="1200" dirty="0" smtClean="0">
-                  <a:solidFill>
-                    <a:schemeClr val="tx1"/>
-                  </a:solidFill>
-                  <a:latin typeface="Courier" charset="0"/>
-                  <a:cs typeface="Courier" charset="0"/>
-                </a:rPr>
-                <a:t>“</a:t>
-              </a:r>
-              <a:r>
-                <a:rPr lang="en-US" sz="1200" b="1" dirty="0" err="1" smtClean="0">
-                  <a:solidFill>
-                    <a:schemeClr val="tx1"/>
-                  </a:solidFill>
-                  <a:latin typeface="Courier" charset="0"/>
-                  <a:cs typeface="Courier" charset="0"/>
-                </a:rPr>
-                <a:t>timeRemainingToCompleteWashingCycle</a:t>
-              </a:r>
-              <a:r>
-                <a:rPr lang="en-US" sz="1200" dirty="0" smtClean="0">
-                  <a:solidFill>
-                    <a:schemeClr val="tx1"/>
-                  </a:solidFill>
-                  <a:latin typeface="Courier" charset="0"/>
-                  <a:cs typeface="Courier" charset="0"/>
-                </a:rPr>
-                <a:t>” </a:t>
-              </a:r>
-              <a:r>
-                <a:rPr lang="en-US" sz="1200" dirty="0">
-                  <a:solidFill>
-                    <a:schemeClr val="tx1"/>
-                  </a:solidFill>
-                  <a:latin typeface="Courier" charset="0"/>
-                  <a:cs typeface="Courier" charset="0"/>
-                </a:rPr>
-                <a:t>type=</a:t>
-              </a:r>
-              <a:r>
-                <a:rPr lang="en-US" sz="1200" dirty="0" smtClean="0">
-                  <a:solidFill>
-                    <a:schemeClr val="tx1"/>
-                  </a:solidFill>
-                  <a:latin typeface="Courier" charset="0"/>
-                  <a:cs typeface="Courier" charset="0"/>
-                </a:rPr>
-                <a:t>“</a:t>
-              </a:r>
-              <a:r>
-                <a:rPr lang="en-US" sz="1200" b="1" dirty="0" smtClean="0">
-                  <a:solidFill>
-                    <a:schemeClr val="tx1"/>
-                  </a:solidFill>
-                  <a:latin typeface="Courier" charset="0"/>
-                  <a:cs typeface="Courier" charset="0"/>
-                </a:rPr>
-                <a:t>time</a:t>
-              </a:r>
-              <a:r>
-                <a:rPr lang="en-US" sz="1200" dirty="0" smtClean="0">
-                  <a:solidFill>
-                    <a:schemeClr val="tx1"/>
-                  </a:solidFill>
-                  <a:latin typeface="Courier" charset="0"/>
-                  <a:cs typeface="Courier" charset="0"/>
-                </a:rPr>
-                <a:t>” </a:t>
-              </a:r>
-              <a:r>
-                <a:rPr lang="en-US" sz="1200" dirty="0">
+                <a:rPr lang="en-US" sz="1200" dirty="0" smtClean="0">
                   <a:solidFill>
                     <a:schemeClr val="tx1"/>
                   </a:solidFill>
@@ -5877,17 +5522,17 @@
                   <a:latin typeface="Courier" charset="0"/>
                   <a:cs typeface="Courier" charset="0"/>
                 </a:rPr>
-                <a:t> </a:t>
-              </a:r>
-              <a:r>
-                <a:rPr lang="en-US" sz="1200" dirty="0" smtClean="0">
-                  <a:solidFill>
-                    <a:schemeClr val="tx1"/>
-                  </a:solidFill>
-                  <a:latin typeface="Courier" charset="0"/>
-                  <a:cs typeface="Courier" charset="0"/>
-                </a:rPr>
-                <a:t>     &lt;</a:t>
+                <a:t>  </a:t>
+              </a:r>
+              <a:r>
+                <a:rPr lang="en-US" sz="1200" dirty="0" smtClean="0">
+                  <a:solidFill>
+                    <a:schemeClr val="tx1"/>
+                  </a:solidFill>
+                  <a:latin typeface="Courier" charset="0"/>
+                  <a:cs typeface="Courier" charset="0"/>
+                </a:rPr>
+                <a:t>    &lt;</a:t>
               </a:r>
               <a:r>
                 <a:rPr lang="en-US" sz="1200" dirty="0" err="1">
@@ -5927,7 +5572,7 @@
                   <a:latin typeface="Courier" charset="0"/>
                   <a:cs typeface="Courier" charset="0"/>
                 </a:rPr>
-                <a:t>onTimerReservationSetting</a:t>
+                <a:t>doorCoverOpenCloseStatus</a:t>
               </a:r>
               <a:r>
                 <a:rPr lang="en-US" sz="1200" dirty="0" smtClean="0">
@@ -5977,52 +5622,22 @@
                   <a:latin typeface="Courier" charset="0"/>
                   <a:cs typeface="Courier" charset="0"/>
                 </a:rPr>
-                <a:t>” </a:t>
-              </a:r>
-              <a:r>
-                <a:rPr lang="en-US" sz="1200" dirty="0">
-                  <a:solidFill>
-                    <a:schemeClr val="tx1"/>
-                  </a:solidFill>
-                  <a:latin typeface="Courier" charset="0"/>
-                  <a:cs typeface="Courier" charset="0"/>
-                </a:rPr>
-                <a:t>writable=“</a:t>
-              </a:r>
-              <a:r>
-                <a:rPr lang="en-US" sz="1200" b="1" dirty="0">
-                  <a:solidFill>
-                    <a:schemeClr val="tx1"/>
-                  </a:solidFill>
-                  <a:latin typeface="Courier" charset="0"/>
-                  <a:cs typeface="Courier" charset="0"/>
-                </a:rPr>
-                <a:t>true</a:t>
-              </a:r>
-              <a:r>
-                <a:rPr lang="en-US" sz="1200" dirty="0">
-                  <a:solidFill>
-                    <a:schemeClr val="tx1"/>
-                  </a:solidFill>
-                  <a:latin typeface="Courier" charset="0"/>
-                  <a:cs typeface="Courier" charset="0"/>
-                </a:rPr>
-                <a:t>” /</a:t>
-              </a:r>
-              <a:r>
-                <a:rPr lang="en-US" sz="1200" dirty="0" smtClean="0">
-                  <a:solidFill>
-                    <a:schemeClr val="tx1"/>
-                  </a:solidFill>
-                  <a:latin typeface="Courier" charset="0"/>
-                  <a:cs typeface="Courier" charset="0"/>
-                </a:rPr>
-                <a:t>&gt;</a:t>
+                <a:t>”&gt;</a:t>
               </a:r>
             </a:p>
             <a:p>
               <a:pPr eaLnBrk="1" hangingPunct="1"/>
               <a:r>
+                <a:rPr lang="en-US" sz="1200" dirty="0" smtClean="0">
+                  <a:solidFill>
+                    <a:schemeClr val="tx1"/>
+                  </a:solidFill>
+                  <a:latin typeface="Courier" charset="0"/>
+                  <a:cs typeface="Courier" charset="0"/>
+                </a:rPr>
+                <a:t>        &lt;</a:t>
+              </a:r>
+              <a:r>
                 <a:rPr lang="en-US" sz="1200" dirty="0">
                   <a:solidFill>
                     <a:schemeClr val="tx1"/>
@@ -6030,137 +5645,7 @@
                   <a:latin typeface="Courier" charset="0"/>
                   <a:cs typeface="Courier" charset="0"/>
                 </a:rPr>
-                <a:t> </a:t>
-              </a:r>
-              <a:r>
-                <a:rPr lang="en-US" sz="1200" dirty="0" smtClean="0">
-                  <a:solidFill>
-                    <a:schemeClr val="tx1"/>
-                  </a:solidFill>
-                  <a:latin typeface="Courier" charset="0"/>
-                  <a:cs typeface="Courier" charset="0"/>
-                </a:rPr>
-                <a:t>     &lt;</a:t>
-              </a:r>
-              <a:r>
-                <a:rPr lang="en-US" sz="1200" dirty="0" err="1">
-                  <a:solidFill>
-                    <a:schemeClr val="tx1"/>
-                  </a:solidFill>
-                  <a:latin typeface="Courier" charset="0"/>
-                  <a:cs typeface="Courier" charset="0"/>
-                </a:rPr>
-                <a:t>DataPoint</a:t>
-              </a:r>
-              <a:r>
-                <a:rPr lang="en-US" sz="1200" dirty="0">
-                  <a:solidFill>
-                    <a:schemeClr val="tx1"/>
-                  </a:solidFill>
-                  <a:latin typeface="Courier" charset="0"/>
-                  <a:cs typeface="Courier" charset="0"/>
-                </a:rPr>
-                <a:t> name=</a:t>
-              </a:r>
-              <a:r>
-                <a:rPr lang="en-US" sz="1200" dirty="0" smtClean="0">
-                  <a:solidFill>
-                    <a:schemeClr val="tx1"/>
-                  </a:solidFill>
-                  <a:latin typeface="Courier" charset="0"/>
-                  <a:cs typeface="Courier" charset="0"/>
-                </a:rPr>
-                <a:t>“</a:t>
-              </a:r>
-              <a:r>
-                <a:rPr lang="en-US" sz="1200" b="1" dirty="0" err="1" smtClean="0">
-                  <a:solidFill>
-                    <a:schemeClr val="tx1"/>
-                  </a:solidFill>
-                  <a:latin typeface="Courier" charset="0"/>
-                  <a:cs typeface="Courier" charset="0"/>
-                </a:rPr>
-                <a:t>onTimerSetting</a:t>
-              </a:r>
-              <a:r>
-                <a:rPr lang="en-US" sz="1200" dirty="0" smtClean="0">
-                  <a:solidFill>
-                    <a:schemeClr val="tx1"/>
-                  </a:solidFill>
-                  <a:latin typeface="Courier" charset="0"/>
-                  <a:cs typeface="Courier" charset="0"/>
-                </a:rPr>
-                <a:t>” </a:t>
-              </a:r>
-              <a:r>
-                <a:rPr lang="en-US" sz="1200" dirty="0">
-                  <a:solidFill>
-                    <a:schemeClr val="tx1"/>
-                  </a:solidFill>
-                  <a:latin typeface="Courier" charset="0"/>
-                  <a:cs typeface="Courier" charset="0"/>
-                </a:rPr>
-                <a:t>type=</a:t>
-              </a:r>
-              <a:r>
-                <a:rPr lang="en-US" sz="1200" dirty="0" smtClean="0">
-                  <a:solidFill>
-                    <a:schemeClr val="tx1"/>
-                  </a:solidFill>
-                  <a:latin typeface="Courier" charset="0"/>
-                  <a:cs typeface="Courier" charset="0"/>
-                </a:rPr>
-                <a:t>“</a:t>
-              </a:r>
-              <a:r>
-                <a:rPr lang="en-US" sz="1200" b="1" dirty="0" smtClean="0">
-                  <a:solidFill>
-                    <a:schemeClr val="tx1"/>
-                  </a:solidFill>
-                  <a:latin typeface="Courier" charset="0"/>
-                  <a:cs typeface="Courier" charset="0"/>
-                </a:rPr>
-                <a:t>time</a:t>
-              </a:r>
-              <a:r>
-                <a:rPr lang="en-US" sz="1200" dirty="0" smtClean="0">
-                  <a:solidFill>
-                    <a:schemeClr val="tx1"/>
-                  </a:solidFill>
-                  <a:latin typeface="Courier" charset="0"/>
-                  <a:cs typeface="Courier" charset="0"/>
-                </a:rPr>
-                <a:t>” </a:t>
-              </a:r>
-              <a:r>
-                <a:rPr lang="en-US" sz="1200" dirty="0">
-                  <a:solidFill>
-                    <a:schemeClr val="tx1"/>
-                  </a:solidFill>
-                  <a:latin typeface="Courier" charset="0"/>
-                  <a:cs typeface="Courier" charset="0"/>
-                </a:rPr>
-                <a:t>writable=“</a:t>
-              </a:r>
-              <a:r>
-                <a:rPr lang="en-US" sz="1200" b="1" dirty="0">
-                  <a:solidFill>
-                    <a:schemeClr val="tx1"/>
-                  </a:solidFill>
-                  <a:latin typeface="Courier" charset="0"/>
-                  <a:cs typeface="Courier" charset="0"/>
-                </a:rPr>
-                <a:t>true</a:t>
-              </a:r>
-              <a:r>
-                <a:rPr lang="en-US" sz="1200" dirty="0">
-                  <a:solidFill>
-                    <a:schemeClr val="tx1"/>
-                  </a:solidFill>
-                  <a:latin typeface="Courier" charset="0"/>
-                  <a:cs typeface="Courier" charset="0"/>
-                </a:rPr>
-                <a:t>” /</a:t>
+                <a:t>Doc</a:t>
               </a:r>
               <a:r>
                 <a:rPr lang="en-US" sz="1200" dirty="0" smtClean="0">
@@ -6176,14 +5661,110 @@
             <a:p>
               <a:pPr eaLnBrk="1" hangingPunct="1"/>
               <a:r>
-                <a:rPr lang="en-US" sz="1200" dirty="0" smtClean="0">
-                  <a:solidFill>
-                    <a:schemeClr val="tx1"/>
-                  </a:solidFill>
-                  <a:latin typeface="Courier" charset="0"/>
-                  <a:cs typeface="Courier" charset="0"/>
-                </a:rPr>
-                <a:t>      &lt;</a:t>
+                <a:rPr lang="en-US" sz="1200" dirty="0">
+                  <a:solidFill>
+                    <a:schemeClr val="tx1"/>
+                  </a:solidFill>
+                  <a:latin typeface="Courier" charset="0"/>
+                  <a:cs typeface="Courier" charset="0"/>
+                </a:rPr>
+                <a:t> </a:t>
+              </a:r>
+              <a:r>
+                <a:rPr lang="en-US" sz="1200" dirty="0" smtClean="0">
+                  <a:solidFill>
+                    <a:schemeClr val="tx1"/>
+                  </a:solidFill>
+                  <a:latin typeface="Courier" charset="0"/>
+                  <a:cs typeface="Courier" charset="0"/>
+                </a:rPr>
+                <a:t>         Indicates </a:t>
+              </a:r>
+              <a:r>
+                <a:rPr lang="en-US" sz="1200" dirty="0">
+                  <a:solidFill>
+                    <a:schemeClr val="tx1"/>
+                  </a:solidFill>
+                  <a:latin typeface="Courier" charset="0"/>
+                  <a:cs typeface="Courier" charset="0"/>
+                </a:rPr>
+                <a:t>whether the </a:t>
+              </a:r>
+              <a:r>
+                <a:rPr lang="en-US" sz="1200" dirty="0" smtClean="0">
+                  <a:solidFill>
+                    <a:schemeClr val="tx1"/>
+                  </a:solidFill>
+                  <a:latin typeface="Courier" charset="0"/>
+                  <a:cs typeface="Courier" charset="0"/>
+                </a:rPr>
+                <a:t>door</a:t>
+              </a:r>
+              <a:r>
+                <a:rPr lang="en-US" sz="1200" dirty="0">
+                  <a:solidFill>
+                    <a:schemeClr val="tx1"/>
+                  </a:solidFill>
+                  <a:latin typeface="Courier" charset="0"/>
+                  <a:cs typeface="Courier" charset="0"/>
+                </a:rPr>
+                <a:t>/cover is open or </a:t>
+              </a:r>
+              <a:r>
+                <a:rPr lang="en-US" sz="1200" dirty="0" smtClean="0">
+                  <a:solidFill>
+                    <a:schemeClr val="tx1"/>
+                  </a:solidFill>
+                  <a:latin typeface="Courier" charset="0"/>
+                  <a:cs typeface="Courier" charset="0"/>
+                </a:rPr>
+                <a:t>closed.</a:t>
+              </a:r>
+            </a:p>
+            <a:p>
+              <a:pPr eaLnBrk="1" hangingPunct="1"/>
+              <a:r>
+                <a:rPr lang="en-US" sz="1200" dirty="0">
+                  <a:solidFill>
+                    <a:schemeClr val="tx1"/>
+                  </a:solidFill>
+                  <a:latin typeface="Courier" charset="0"/>
+                  <a:cs typeface="Courier" charset="0"/>
+                </a:rPr>
+                <a:t> </a:t>
+              </a:r>
+              <a:r>
+                <a:rPr lang="en-US" sz="1200" dirty="0" smtClean="0">
+                  <a:solidFill>
+                    <a:schemeClr val="tx1"/>
+                  </a:solidFill>
+                  <a:latin typeface="Courier" charset="0"/>
+                  <a:cs typeface="Courier" charset="0"/>
+                </a:rPr>
+                <a:t>       &lt;</a:t>
+              </a:r>
+              <a:r>
+                <a:rPr lang="en-US" sz="1200" dirty="0">
+                  <a:solidFill>
+                    <a:schemeClr val="tx1"/>
+                  </a:solidFill>
+                  <a:latin typeface="Courier" charset="0"/>
+                  <a:cs typeface="Courier" charset="0"/>
+                </a:rPr>
+                <a:t>/Doc&gt;</a:t>
+              </a:r>
+            </a:p>
+            <a:p>
+              <a:pPr eaLnBrk="1" hangingPunct="1"/>
+              <a:r>
+                <a:rPr lang="en-US" sz="1200" dirty="0">
+                  <a:solidFill>
+                    <a:schemeClr val="tx1"/>
+                  </a:solidFill>
+                  <a:latin typeface="Courier" charset="0"/>
+                  <a:cs typeface="Courier" charset="0"/>
+                </a:rPr>
+                <a:t>	 &lt;/</a:t>
               </a:r>
               <a:r>
                 <a:rPr lang="en-US" sz="1200" dirty="0" err="1">
@@ -6203,6 +5784,49 @@
                   <a:latin typeface="Courier" charset="0"/>
                   <a:cs typeface="Courier" charset="0"/>
                 </a:rPr>
+                <a:t>/&gt;</a:t>
+              </a:r>
+            </a:p>
+            <a:p>
+              <a:pPr eaLnBrk="1" hangingPunct="1"/>
+              <a:r>
+                <a:rPr lang="en-US" sz="1200" dirty="0" smtClean="0">
+                  <a:solidFill>
+                    <a:schemeClr val="tx1"/>
+                  </a:solidFill>
+                  <a:latin typeface="Courier" charset="0"/>
+                  <a:cs typeface="Courier" charset="0"/>
+                </a:rPr>
+                <a:t>      </a:t>
+              </a:r>
+              <a:r>
+                <a:rPr lang="en-US" sz="1200" dirty="0" smtClean="0">
+                  <a:solidFill>
+                    <a:schemeClr val="tx1"/>
+                  </a:solidFill>
+                  <a:latin typeface="Courier" charset="0"/>
+                  <a:cs typeface="Courier" charset="0"/>
+                </a:rPr>
+                <a:t>&lt;</a:t>
+              </a:r>
+              <a:r>
+                <a:rPr lang="en-US" sz="1200" dirty="0" err="1">
+                  <a:solidFill>
+                    <a:schemeClr val="tx1"/>
+                  </a:solidFill>
+                  <a:latin typeface="Courier" charset="0"/>
+                  <a:cs typeface="Courier" charset="0"/>
+                </a:rPr>
+                <a:t>DataPoint</a:t>
+              </a:r>
+              <a:r>
+                <a:rPr lang="en-US" sz="1200" dirty="0">
+                  <a:solidFill>
+                    <a:schemeClr val="tx1"/>
+                  </a:solidFill>
+                  <a:latin typeface="Courier" charset="0"/>
+                  <a:cs typeface="Courier" charset="0"/>
+                </a:rPr>
                 <a:t> name=</a:t>
               </a:r>
               <a:r>
@@ -6223,7 +5847,7 @@
                   <a:latin typeface="Courier" charset="0"/>
                   <a:cs typeface="Courier" charset="0"/>
                 </a:rPr>
-                <a:t>relativeOnTimeBasedTimerSetting</a:t>
+                <a:t>washingMachineSetting</a:t>
               </a:r>
               <a:r>
                 <a:rPr lang="en-US" sz="1200" dirty="0" smtClean="0">
@@ -6263,17 +5887,7 @@
                   <a:latin typeface="Courier" charset="0"/>
                   <a:cs typeface="Courier" charset="0"/>
                 </a:rPr>
-                <a:t>time</a:t>
-              </a:r>
-              <a:r>
-                <a:rPr lang="en-US" sz="1200" dirty="0" smtClean="0">
-                  <a:solidFill>
-                    <a:schemeClr val="tx1"/>
-                  </a:solidFill>
-                  <a:latin typeface="Courier" charset="0"/>
-                  <a:cs typeface="Courier" charset="0"/>
-                </a:rPr>
-                <a:t>” </a:t>
+                <a:t>integer</a:t>
               </a:r>
               <a:r>
                 <a:rPr lang="en-US" sz="1200" dirty="0">
@@ -6283,7 +5897,7 @@
                   <a:latin typeface="Courier" charset="0"/>
                   <a:cs typeface="Courier" charset="0"/>
                 </a:rPr>
-                <a:t>writable=“</a:t>
+                <a:t>” writable=“</a:t>
               </a:r>
               <a:r>
                 <a:rPr lang="en-US" sz="1200" b="1" dirty="0">
@@ -6296,6 +5910,19 @@
                 <a:t>true</a:t>
               </a:r>
               <a:r>
+                <a:rPr lang="en-US" sz="1200" dirty="0" smtClean="0">
+                  <a:solidFill>
+                    <a:schemeClr val="tx1"/>
+                  </a:solidFill>
+                  <a:latin typeface="Courier" charset="0"/>
+                  <a:cs typeface="Courier" charset="0"/>
+                </a:rPr>
+                <a:t>”&gt;</a:t>
+              </a:r>
+            </a:p>
+            <a:p>
+              <a:pPr eaLnBrk="1" hangingPunct="1"/>
+              <a:r>
                 <a:rPr lang="en-US" sz="1200" dirty="0">
                   <a:solidFill>
                     <a:schemeClr val="tx1"/>
@@ -6303,7 +5930,27 @@
                   <a:latin typeface="Courier" charset="0"/>
                   <a:cs typeface="Courier" charset="0"/>
                 </a:rPr>
-                <a:t>” /</a:t>
+                <a:t> </a:t>
+              </a:r>
+              <a:r>
+                <a:rPr lang="en-US" sz="1200" dirty="0" smtClean="0">
+                  <a:solidFill>
+                    <a:schemeClr val="tx1"/>
+                  </a:solidFill>
+                  <a:latin typeface="Courier" charset="0"/>
+                  <a:cs typeface="Courier" charset="0"/>
+                </a:rPr>
+                <a:t>       &lt;</a:t>
+              </a:r>
+              <a:r>
+                <a:rPr lang="en-US" sz="1200" dirty="0">
+                  <a:solidFill>
+                    <a:schemeClr val="tx1"/>
+                  </a:solidFill>
+                  <a:latin typeface="Courier" charset="0"/>
+                  <a:cs typeface="Courier" charset="0"/>
+                </a:rPr>
+                <a:t>Doc</a:t>
               </a:r>
               <a:r>
                 <a:rPr lang="en-US" sz="1200" dirty="0" smtClean="0">
@@ -6315,7 +5962,83 @@
                 </a:rPr>
                 <a:t>&gt;</a:t>
               </a:r>
-              <a:endParaRPr lang="en-US" sz="1200" dirty="0">
+            </a:p>
+            <a:p>
+              <a:pPr eaLnBrk="1" hangingPunct="1"/>
+              <a:r>
+                <a:rPr lang="en-US" sz="1200" dirty="0">
+                  <a:solidFill>
+                    <a:schemeClr val="tx1"/>
+                  </a:solidFill>
+                  <a:latin typeface="Courier" charset="0"/>
+                  <a:cs typeface="Courier" charset="0"/>
+                </a:rPr>
+                <a:t> </a:t>
+              </a:r>
+              <a:r>
+                <a:rPr lang="en-US" sz="1200" dirty="0" smtClean="0">
+                  <a:solidFill>
+                    <a:schemeClr val="tx1"/>
+                  </a:solidFill>
+                  <a:latin typeface="Courier" charset="0"/>
+                  <a:cs typeface="Courier" charset="0"/>
+                </a:rPr>
+                <a:t>         Washing </a:t>
+              </a:r>
+              <a:r>
+                <a:rPr lang="en-US" sz="1200" dirty="0">
+                  <a:solidFill>
+                    <a:schemeClr val="tx1"/>
+                  </a:solidFill>
+                  <a:latin typeface="Courier" charset="0"/>
+                  <a:cs typeface="Courier" charset="0"/>
+                </a:rPr>
+                <a:t>machine setting</a:t>
+              </a:r>
+              <a:r>
+                <a:rPr lang="en-US" sz="1200" dirty="0" smtClean="0">
+                  <a:solidFill>
+                    <a:schemeClr val="tx1"/>
+                  </a:solidFill>
+                  <a:latin typeface="Courier" charset="0"/>
+                  <a:cs typeface="Courier" charset="0"/>
+                </a:rPr>
+                <a:t>.</a:t>
+              </a:r>
+            </a:p>
+            <a:p>
+              <a:pPr eaLnBrk="1" hangingPunct="1"/>
+              <a:r>
+                <a:rPr lang="en-US" sz="1200" dirty="0">
+                  <a:solidFill>
+                    <a:schemeClr val="tx1"/>
+                  </a:solidFill>
+                  <a:latin typeface="Courier" charset="0"/>
+                  <a:cs typeface="Courier" charset="0"/>
+                </a:rPr>
+                <a:t> </a:t>
+              </a:r>
+              <a:r>
+                <a:rPr lang="en-US" sz="1200" dirty="0" smtClean="0">
+                  <a:solidFill>
+                    <a:schemeClr val="tx1"/>
+                  </a:solidFill>
+                  <a:latin typeface="Courier" charset="0"/>
+                  <a:cs typeface="Courier" charset="0"/>
+                </a:rPr>
+                <a:t>       &lt;</a:t>
+              </a:r>
+              <a:r>
+                <a:rPr lang="en-US" sz="1200" dirty="0">
+                  <a:solidFill>
+                    <a:schemeClr val="tx1"/>
+                  </a:solidFill>
+                  <a:latin typeface="Courier" charset="0"/>
+                  <a:cs typeface="Courier" charset="0"/>
+                </a:rPr>
+                <a:t>/Doc&gt;</a:t>
+              </a:r>
+              <a:endParaRPr lang="en-US" sz="1200" dirty="0" smtClean="0">
                 <a:solidFill>
                   <a:schemeClr val="tx1"/>
                 </a:solidFill>
@@ -6326,16 +6049,6 @@
             <a:p>
               <a:pPr eaLnBrk="1" hangingPunct="1"/>
               <a:r>
-                <a:rPr lang="en-US" sz="1200" dirty="0" smtClean="0">
-                  <a:solidFill>
-                    <a:schemeClr val="tx1"/>
-                  </a:solidFill>
-                  <a:latin typeface="Courier" charset="0"/>
-                  <a:cs typeface="Courier" charset="0"/>
-                </a:rPr>
-                <a:t>    &lt;</a:t>
-              </a:r>
-              <a:r>
                 <a:rPr lang="en-US" sz="1200" dirty="0">
                   <a:solidFill>
                     <a:schemeClr val="tx1"/>
@@ -6343,17 +6056,27 @@
                   <a:latin typeface="Courier" charset="0"/>
                   <a:cs typeface="Courier" charset="0"/>
                 </a:rPr>
-                <a:t>/Data</a:t>
-              </a:r>
-              <a:r>
-                <a:rPr lang="en-US" sz="1200" dirty="0" smtClean="0">
-                  <a:solidFill>
-                    <a:schemeClr val="tx1"/>
-                  </a:solidFill>
-                  <a:latin typeface="Courier" charset="0"/>
-                  <a:cs typeface="Courier" charset="0"/>
-                </a:rPr>
-                <a:t>&gt;</a:t>
+                <a:t>	 &lt;/</a:t>
+              </a:r>
+              <a:r>
+                <a:rPr lang="en-US" sz="1200" dirty="0" err="1">
+                  <a:solidFill>
+                    <a:schemeClr val="tx1"/>
+                  </a:solidFill>
+                  <a:latin typeface="Courier" charset="0"/>
+                  <a:cs typeface="Courier" charset="0"/>
+                </a:rPr>
+                <a:t>DataPoint</a:t>
+              </a:r>
+              <a:r>
+                <a:rPr lang="en-US" sz="1200" dirty="0">
+                  <a:solidFill>
+                    <a:schemeClr val="tx1"/>
+                  </a:solidFill>
+                  <a:latin typeface="Courier" charset="0"/>
+                  <a:cs typeface="Courier" charset="0"/>
+                </a:rPr>
+                <a:t>/&gt;</a:t>
               </a:r>
             </a:p>
             <a:p>
@@ -6366,7 +6089,27 @@
                   <a:latin typeface="Courier" charset="0"/>
                   <a:cs typeface="Courier" charset="0"/>
                 </a:rPr>
-                <a:t>  &lt;</a:t>
+                <a:t>      </a:t>
+              </a:r>
+              <a:r>
+                <a:rPr lang="en-US" sz="1200" dirty="0" smtClean="0">
+                  <a:solidFill>
+                    <a:schemeClr val="tx1"/>
+                  </a:solidFill>
+                  <a:latin typeface="Courier" charset="0"/>
+                  <a:cs typeface="Courier" charset="0"/>
+                </a:rPr>
+                <a:t>&lt;</a:t>
+              </a:r>
+              <a:r>
+                <a:rPr lang="en-US" sz="1200" dirty="0" err="1">
+                  <a:solidFill>
+                    <a:schemeClr val="tx1"/>
+                  </a:solidFill>
+                  <a:latin typeface="Courier" charset="0"/>
+                  <a:cs typeface="Courier" charset="0"/>
+                </a:rPr>
+                <a:t>DataPoint</a:t>
               </a:r>
               <a:r>
                 <a:rPr lang="en-US" sz="1200" dirty="0">
@@ -6376,27 +6119,77 @@
                   <a:latin typeface="Courier" charset="0"/>
                   <a:cs typeface="Courier" charset="0"/>
                 </a:rPr>
-                <a:t>/</a:t>
-              </a:r>
-              <a:r>
-                <a:rPr lang="en-US" sz="1200" dirty="0" err="1">
-                  <a:solidFill>
-                    <a:schemeClr val="tx1"/>
-                  </a:solidFill>
-                  <a:latin typeface="Courier" charset="0"/>
-                  <a:cs typeface="Courier" charset="0"/>
-                </a:rPr>
-                <a:t>ModuleClass</a:t>
-              </a:r>
-              <a:r>
-                <a:rPr lang="en-US" sz="1200" dirty="0" smtClean="0">
-                  <a:solidFill>
-                    <a:schemeClr val="tx1"/>
-                  </a:solidFill>
-                  <a:latin typeface="Courier" charset="0"/>
-                  <a:cs typeface="Courier" charset="0"/>
-                </a:rPr>
-                <a:t>&gt;</a:t>
+                <a:t> name=</a:t>
+              </a:r>
+              <a:r>
+                <a:rPr lang="en-US" sz="1200" dirty="0" smtClean="0">
+                  <a:solidFill>
+                    <a:schemeClr val="tx1"/>
+                  </a:solidFill>
+                  <a:latin typeface="Courier" charset="0"/>
+                  <a:cs typeface="Courier" charset="0"/>
+                </a:rPr>
+                <a:t>“</a:t>
+              </a:r>
+              <a:r>
+                <a:rPr lang="en-US" sz="1200" b="1" dirty="0" err="1" smtClean="0">
+                  <a:solidFill>
+                    <a:schemeClr val="tx1"/>
+                  </a:solidFill>
+                  <a:latin typeface="Courier" charset="0"/>
+                  <a:cs typeface="Courier" charset="0"/>
+                </a:rPr>
+                <a:t>currentStageOfWashingCycle</a:t>
+              </a:r>
+              <a:r>
+                <a:rPr lang="en-US" sz="1200" dirty="0" smtClean="0">
+                  <a:solidFill>
+                    <a:schemeClr val="tx1"/>
+                  </a:solidFill>
+                  <a:latin typeface="Courier" charset="0"/>
+                  <a:cs typeface="Courier" charset="0"/>
+                </a:rPr>
+                <a:t>” </a:t>
+              </a:r>
+              <a:r>
+                <a:rPr lang="en-US" sz="1200" dirty="0">
+                  <a:solidFill>
+                    <a:schemeClr val="tx1"/>
+                  </a:solidFill>
+                  <a:latin typeface="Courier" charset="0"/>
+                  <a:cs typeface="Courier" charset="0"/>
+                </a:rPr>
+                <a:t>type=</a:t>
+              </a:r>
+              <a:r>
+                <a:rPr lang="en-US" sz="1200" dirty="0" smtClean="0">
+                  <a:solidFill>
+                    <a:schemeClr val="tx1"/>
+                  </a:solidFill>
+                  <a:latin typeface="Courier" charset="0"/>
+                  <a:cs typeface="Courier" charset="0"/>
+                </a:rPr>
+                <a:t>“</a:t>
+              </a:r>
+              <a:r>
+                <a:rPr lang="en-US" sz="1200" b="1" dirty="0" smtClean="0">
+                  <a:solidFill>
+                    <a:schemeClr val="tx1"/>
+                  </a:solidFill>
+                  <a:latin typeface="Courier" charset="0"/>
+                  <a:cs typeface="Courier" charset="0"/>
+                </a:rPr>
+                <a:t>integer</a:t>
+              </a:r>
+              <a:r>
+                <a:rPr lang="en-US" sz="1200" dirty="0" smtClean="0">
+                  <a:solidFill>
+                    <a:schemeClr val="tx1"/>
+                  </a:solidFill>
+                  <a:latin typeface="Courier" charset="0"/>
+                  <a:cs typeface="Courier" charset="0"/>
+                </a:rPr>
+                <a:t>”&gt;</a:t>
               </a:r>
             </a:p>
             <a:p>
@@ -6409,7 +6202,176 @@
                   <a:latin typeface="Courier" charset="0"/>
                   <a:cs typeface="Courier" charset="0"/>
                 </a:rPr>
-                <a:t>&lt;/Domain&gt;</a:t>
+                <a:t>        </a:t>
+              </a:r>
+              <a:r>
+                <a:rPr lang="en-US" sz="1200" dirty="0">
+                  <a:solidFill>
+                    <a:schemeClr val="tx1"/>
+                  </a:solidFill>
+                  <a:latin typeface="Courier" charset="0"/>
+                  <a:cs typeface="Courier" charset="0"/>
+                </a:rPr>
+                <a:t>&lt;Doc</a:t>
+              </a:r>
+              <a:r>
+                <a:rPr lang="en-US" sz="1200" dirty="0" smtClean="0">
+                  <a:solidFill>
+                    <a:schemeClr val="tx1"/>
+                  </a:solidFill>
+                  <a:latin typeface="Courier" charset="0"/>
+                  <a:cs typeface="Courier" charset="0"/>
+                </a:rPr>
+                <a:t>&gt;</a:t>
+              </a:r>
+            </a:p>
+            <a:p>
+              <a:pPr eaLnBrk="1" hangingPunct="1"/>
+              <a:r>
+                <a:rPr lang="en-US" sz="1200" dirty="0">
+                  <a:solidFill>
+                    <a:schemeClr val="tx1"/>
+                  </a:solidFill>
+                  <a:latin typeface="Courier" charset="0"/>
+                  <a:cs typeface="Courier" charset="0"/>
+                </a:rPr>
+                <a:t> </a:t>
+              </a:r>
+              <a:r>
+                <a:rPr lang="en-US" sz="1200" dirty="0" smtClean="0">
+                  <a:solidFill>
+                    <a:schemeClr val="tx1"/>
+                  </a:solidFill>
+                  <a:latin typeface="Courier" charset="0"/>
+                  <a:cs typeface="Courier" charset="0"/>
+                </a:rPr>
+                <a:t>         Indicates </a:t>
+              </a:r>
+              <a:r>
+                <a:rPr lang="en-US" sz="1200" dirty="0">
+                  <a:solidFill>
+                    <a:schemeClr val="tx1"/>
+                  </a:solidFill>
+                  <a:latin typeface="Courier" charset="0"/>
+                  <a:cs typeface="Courier" charset="0"/>
+                </a:rPr>
+                <a:t>the current </a:t>
+              </a:r>
+              <a:r>
+                <a:rPr lang="en-US" sz="1200" dirty="0" smtClean="0">
+                  <a:solidFill>
+                    <a:schemeClr val="tx1"/>
+                  </a:solidFill>
+                  <a:latin typeface="Courier" charset="0"/>
+                  <a:cs typeface="Courier" charset="0"/>
+                </a:rPr>
+                <a:t>stage </a:t>
+              </a:r>
+              <a:r>
+                <a:rPr lang="en-US" sz="1200" dirty="0">
+                  <a:solidFill>
+                    <a:schemeClr val="tx1"/>
+                  </a:solidFill>
+                  <a:latin typeface="Courier" charset="0"/>
+                  <a:cs typeface="Courier" charset="0"/>
+                </a:rPr>
+                <a:t>of the washing </a:t>
+              </a:r>
+              <a:r>
+                <a:rPr lang="en-US" sz="1200" dirty="0" smtClean="0">
+                  <a:solidFill>
+                    <a:schemeClr val="tx1"/>
+                  </a:solidFill>
+                  <a:latin typeface="Courier" charset="0"/>
+                  <a:cs typeface="Courier" charset="0"/>
+                </a:rPr>
+                <a:t>cycle.</a:t>
+              </a:r>
+            </a:p>
+            <a:p>
+              <a:pPr eaLnBrk="1" hangingPunct="1"/>
+              <a:r>
+                <a:rPr lang="en-US" sz="1200" dirty="0">
+                  <a:solidFill>
+                    <a:schemeClr val="tx1"/>
+                  </a:solidFill>
+                  <a:latin typeface="Courier" charset="0"/>
+                  <a:cs typeface="Courier" charset="0"/>
+                </a:rPr>
+                <a:t> </a:t>
+              </a:r>
+              <a:r>
+                <a:rPr lang="en-US" sz="1200" dirty="0" smtClean="0">
+                  <a:solidFill>
+                    <a:schemeClr val="tx1"/>
+                  </a:solidFill>
+                  <a:latin typeface="Courier" charset="0"/>
+                  <a:cs typeface="Courier" charset="0"/>
+                </a:rPr>
+                <a:t>       &lt;</a:t>
+              </a:r>
+              <a:r>
+                <a:rPr lang="en-US" sz="1200" dirty="0">
+                  <a:solidFill>
+                    <a:schemeClr val="tx1"/>
+                  </a:solidFill>
+                  <a:latin typeface="Courier" charset="0"/>
+                  <a:cs typeface="Courier" charset="0"/>
+                </a:rPr>
+                <a:t>/Doc&gt;</a:t>
+              </a:r>
+              <a:endParaRPr lang="en-US" sz="1200" dirty="0" smtClean="0">
+                <a:solidFill>
+                  <a:schemeClr val="tx1"/>
+                </a:solidFill>
+                <a:latin typeface="Courier" charset="0"/>
+                <a:cs typeface="Courier" charset="0"/>
+              </a:endParaRPr>
+            </a:p>
+            <a:p>
+              <a:pPr eaLnBrk="1" hangingPunct="1"/>
+              <a:r>
+                <a:rPr lang="en-US" sz="1200" dirty="0">
+                  <a:solidFill>
+                    <a:schemeClr val="tx1"/>
+                  </a:solidFill>
+                  <a:latin typeface="Courier" charset="0"/>
+                  <a:cs typeface="Courier" charset="0"/>
+                </a:rPr>
+                <a:t>	 &lt;/</a:t>
+              </a:r>
+              <a:r>
+                <a:rPr lang="en-US" sz="1200" dirty="0" err="1">
+                  <a:solidFill>
+                    <a:schemeClr val="tx1"/>
+                  </a:solidFill>
+                  <a:latin typeface="Courier" charset="0"/>
+                  <a:cs typeface="Courier" charset="0"/>
+                </a:rPr>
+                <a:t>DataPoint</a:t>
+              </a:r>
+              <a:r>
+                <a:rPr lang="en-US" sz="1200" dirty="0">
+                  <a:solidFill>
+                    <a:schemeClr val="tx1"/>
+                  </a:solidFill>
+                  <a:latin typeface="Courier" charset="0"/>
+                  <a:cs typeface="Courier" charset="0"/>
+                </a:rPr>
+                <a:t>/&gt;</a:t>
+              </a:r>
+            </a:p>
+            <a:p>
+              <a:pPr eaLnBrk="1" hangingPunct="1"/>
+              <a:r>
+                <a:rPr lang="en-US" sz="1200" dirty="0" smtClean="0">
+                  <a:solidFill>
+                    <a:schemeClr val="tx1"/>
+                  </a:solidFill>
+                  <a:latin typeface="Courier" charset="0"/>
+                  <a:cs typeface="Courier" charset="0"/>
+                </a:rPr>
+                <a:t> </a:t>
               </a:r>
               <a:endParaRPr lang="en-US" sz="1200" dirty="0">
                 <a:solidFill>
@@ -6526,6 +6488,1441 @@
           <a:p>
             <a:r>
               <a:rPr lang="en-CA" altLang="en-US" sz="3600" dirty="0" smtClean="0"/>
+              <a:t>Translation to </a:t>
+            </a:r>
+            <a:r>
+              <a:rPr lang="en-CA" altLang="en-US" sz="3600" dirty="0" smtClean="0"/>
+              <a:t>SDT (2/2)</a:t>
+            </a:r>
+            <a:endParaRPr lang="en-CA" altLang="en-US" sz="3600" dirty="0" smtClean="0"/>
+          </a:p>
+        </p:txBody>
+      </p:sp>
+      <p:grpSp>
+        <p:nvGrpSpPr>
+          <p:cNvPr id="5" name="Group 9"/>
+          <p:cNvGrpSpPr>
+            <a:grpSpLocks/>
+          </p:cNvGrpSpPr>
+          <p:nvPr/>
+        </p:nvGrpSpPr>
+        <p:grpSpPr bwMode="auto">
+          <a:xfrm>
+            <a:off x="457201" y="1243460"/>
+            <a:ext cx="8229600" cy="4798951"/>
+            <a:chOff x="-2743199" y="-766980"/>
+            <a:chExt cx="8229600" cy="4799341"/>
+          </a:xfrm>
+        </p:grpSpPr>
+        <p:sp>
+          <p:nvSpPr>
+            <p:cNvPr id="6" name="TextBox 5"/>
+            <p:cNvSpPr txBox="1">
+              <a:spLocks noChangeArrowheads="1"/>
+            </p:cNvSpPr>
+            <p:nvPr/>
+          </p:nvSpPr>
+          <p:spPr bwMode="auto">
+            <a:xfrm>
+              <a:off x="-2743199" y="-492321"/>
+              <a:ext cx="8229600" cy="4524682"/>
+            </a:xfrm>
+            <a:prstGeom prst="rect">
+              <a:avLst/>
+            </a:prstGeom>
+            <a:noFill/>
+            <a:ln w="19050">
+              <a:solidFill>
+                <a:srgbClr val="04617B"/>
+              </a:solidFill>
+              <a:miter lim="800000"/>
+              <a:headEnd/>
+              <a:tailEnd/>
+            </a:ln>
+            <a:extLst>
+              <a:ext uri="{909E8E84-426E-40dd-AFC4-6F175D3DCCD1}">
+                <a14:hiddenFill xmlns:a14="http://schemas.microsoft.com/office/drawing/2010/main">
+                  <a:solidFill>
+                    <a:srgbClr val="FFFFFF"/>
+                  </a:solidFill>
+                </a14:hiddenFill>
+              </a:ext>
+            </a:extLst>
+          </p:spPr>
+          <p:txBody>
+            <a:bodyPr wrap="square" rIns="0">
+              <a:spAutoFit/>
+            </a:bodyPr>
+            <a:lstStyle>
+              <a:lvl1pPr eaLnBrk="0" hangingPunct="0">
+                <a:defRPr sz="1600">
+                  <a:solidFill>
+                    <a:schemeClr val="bg1"/>
+                  </a:solidFill>
+                  <a:latin typeface="Arial" charset="0"/>
+                  <a:ea typeface="ＭＳ Ｐゴシック" charset="0"/>
+                  <a:cs typeface="Lucida Sans Unicode" charset="0"/>
+                </a:defRPr>
+              </a:lvl1pPr>
+              <a:lvl2pPr marL="37931725" indent="-37474525" eaLnBrk="0" hangingPunct="0">
+                <a:defRPr sz="1600">
+                  <a:solidFill>
+                    <a:schemeClr val="bg1"/>
+                  </a:solidFill>
+                  <a:latin typeface="Arial" charset="0"/>
+                  <a:ea typeface="Lucida Sans Unicode" charset="0"/>
+                  <a:cs typeface="Lucida Sans Unicode" charset="0"/>
+                </a:defRPr>
+              </a:lvl2pPr>
+              <a:lvl3pPr eaLnBrk="0" hangingPunct="0">
+                <a:defRPr sz="1600">
+                  <a:solidFill>
+                    <a:schemeClr val="bg1"/>
+                  </a:solidFill>
+                  <a:latin typeface="Arial" charset="0"/>
+                  <a:ea typeface="Lucida Sans Unicode" charset="0"/>
+                  <a:cs typeface="Lucida Sans Unicode" charset="0"/>
+                </a:defRPr>
+              </a:lvl3pPr>
+              <a:lvl4pPr eaLnBrk="0" hangingPunct="0">
+                <a:defRPr sz="1600">
+                  <a:solidFill>
+                    <a:schemeClr val="bg1"/>
+                  </a:solidFill>
+                  <a:latin typeface="Arial" charset="0"/>
+                  <a:ea typeface="Lucida Sans Unicode" charset="0"/>
+                  <a:cs typeface="Lucida Sans Unicode" charset="0"/>
+                </a:defRPr>
+              </a:lvl4pPr>
+              <a:lvl5pPr eaLnBrk="0" hangingPunct="0">
+                <a:defRPr sz="1600">
+                  <a:solidFill>
+                    <a:schemeClr val="bg1"/>
+                  </a:solidFill>
+                  <a:latin typeface="Arial" charset="0"/>
+                  <a:ea typeface="Lucida Sans Unicode" charset="0"/>
+                  <a:cs typeface="Lucida Sans Unicode" charset="0"/>
+                </a:defRPr>
+              </a:lvl5pPr>
+              <a:lvl6pPr marL="457200" eaLnBrk="0" fontAlgn="base" hangingPunct="0">
+                <a:spcBef>
+                  <a:spcPct val="0"/>
+                </a:spcBef>
+                <a:spcAft>
+                  <a:spcPct val="0"/>
+                </a:spcAft>
+                <a:defRPr sz="1600">
+                  <a:solidFill>
+                    <a:schemeClr val="bg1"/>
+                  </a:solidFill>
+                  <a:latin typeface="Arial" charset="0"/>
+                  <a:ea typeface="Lucida Sans Unicode" charset="0"/>
+                  <a:cs typeface="Lucida Sans Unicode" charset="0"/>
+                </a:defRPr>
+              </a:lvl6pPr>
+              <a:lvl7pPr marL="914400" eaLnBrk="0" fontAlgn="base" hangingPunct="0">
+                <a:spcBef>
+                  <a:spcPct val="0"/>
+                </a:spcBef>
+                <a:spcAft>
+                  <a:spcPct val="0"/>
+                </a:spcAft>
+                <a:defRPr sz="1600">
+                  <a:solidFill>
+                    <a:schemeClr val="bg1"/>
+                  </a:solidFill>
+                  <a:latin typeface="Arial" charset="0"/>
+                  <a:ea typeface="Lucida Sans Unicode" charset="0"/>
+                  <a:cs typeface="Lucida Sans Unicode" charset="0"/>
+                </a:defRPr>
+              </a:lvl7pPr>
+              <a:lvl8pPr marL="1371600" eaLnBrk="0" fontAlgn="base" hangingPunct="0">
+                <a:spcBef>
+                  <a:spcPct val="0"/>
+                </a:spcBef>
+                <a:spcAft>
+                  <a:spcPct val="0"/>
+                </a:spcAft>
+                <a:defRPr sz="1600">
+                  <a:solidFill>
+                    <a:schemeClr val="bg1"/>
+                  </a:solidFill>
+                  <a:latin typeface="Arial" charset="0"/>
+                  <a:ea typeface="Lucida Sans Unicode" charset="0"/>
+                  <a:cs typeface="Lucida Sans Unicode" charset="0"/>
+                </a:defRPr>
+              </a:lvl8pPr>
+              <a:lvl9pPr marL="1828800" eaLnBrk="0" fontAlgn="base" hangingPunct="0">
+                <a:spcBef>
+                  <a:spcPct val="0"/>
+                </a:spcBef>
+                <a:spcAft>
+                  <a:spcPct val="0"/>
+                </a:spcAft>
+                <a:defRPr sz="1600">
+                  <a:solidFill>
+                    <a:schemeClr val="bg1"/>
+                  </a:solidFill>
+                  <a:latin typeface="Arial" charset="0"/>
+                  <a:ea typeface="Lucida Sans Unicode" charset="0"/>
+                  <a:cs typeface="Lucida Sans Unicode" charset="0"/>
+                </a:defRPr>
+              </a:lvl9pPr>
+            </a:lstStyle>
+            <a:p>
+              <a:pPr eaLnBrk="1" hangingPunct="1"/>
+              <a:r>
+                <a:rPr lang="en-US" sz="1200" dirty="0" smtClean="0">
+                  <a:solidFill>
+                    <a:schemeClr val="tx1"/>
+                  </a:solidFill>
+                  <a:latin typeface="Courier" charset="0"/>
+                  <a:cs typeface="Courier" charset="0"/>
+                </a:rPr>
+                <a:t>      &lt;</a:t>
+              </a:r>
+              <a:r>
+                <a:rPr lang="en-US" sz="1200" dirty="0" err="1">
+                  <a:solidFill>
+                    <a:schemeClr val="tx1"/>
+                  </a:solidFill>
+                  <a:latin typeface="Courier" charset="0"/>
+                  <a:cs typeface="Courier" charset="0"/>
+                </a:rPr>
+                <a:t>DataPoint</a:t>
+              </a:r>
+              <a:r>
+                <a:rPr lang="en-US" sz="1200" dirty="0">
+                  <a:solidFill>
+                    <a:schemeClr val="tx1"/>
+                  </a:solidFill>
+                  <a:latin typeface="Courier" charset="0"/>
+                  <a:cs typeface="Courier" charset="0"/>
+                </a:rPr>
+                <a:t> name=</a:t>
+              </a:r>
+              <a:r>
+                <a:rPr lang="en-US" sz="1200" dirty="0" smtClean="0">
+                  <a:solidFill>
+                    <a:schemeClr val="tx1"/>
+                  </a:solidFill>
+                  <a:latin typeface="Courier" charset="0"/>
+                  <a:cs typeface="Courier" charset="0"/>
+                </a:rPr>
+                <a:t>“</a:t>
+              </a:r>
+              <a:r>
+                <a:rPr lang="en-US" sz="1200" b="1" dirty="0" err="1" smtClean="0">
+                  <a:solidFill>
+                    <a:schemeClr val="tx1"/>
+                  </a:solidFill>
+                  <a:latin typeface="Courier" charset="0"/>
+                  <a:cs typeface="Courier" charset="0"/>
+                </a:rPr>
+                <a:t>timeRemainingToCompleteWashingCycle</a:t>
+              </a:r>
+              <a:r>
+                <a:rPr lang="en-US" sz="1200" dirty="0" smtClean="0">
+                  <a:solidFill>
+                    <a:schemeClr val="tx1"/>
+                  </a:solidFill>
+                  <a:latin typeface="Courier" charset="0"/>
+                  <a:cs typeface="Courier" charset="0"/>
+                </a:rPr>
+                <a:t>” </a:t>
+              </a:r>
+              <a:r>
+                <a:rPr lang="en-US" sz="1200" dirty="0">
+                  <a:solidFill>
+                    <a:schemeClr val="tx1"/>
+                  </a:solidFill>
+                  <a:latin typeface="Courier" charset="0"/>
+                  <a:cs typeface="Courier" charset="0"/>
+                </a:rPr>
+                <a:t>type=</a:t>
+              </a:r>
+              <a:r>
+                <a:rPr lang="en-US" sz="1200" dirty="0" smtClean="0">
+                  <a:solidFill>
+                    <a:schemeClr val="tx1"/>
+                  </a:solidFill>
+                  <a:latin typeface="Courier" charset="0"/>
+                  <a:cs typeface="Courier" charset="0"/>
+                </a:rPr>
+                <a:t>“</a:t>
+              </a:r>
+              <a:r>
+                <a:rPr lang="en-US" sz="1200" b="1" dirty="0" smtClean="0">
+                  <a:solidFill>
+                    <a:schemeClr val="tx1"/>
+                  </a:solidFill>
+                  <a:latin typeface="Courier" charset="0"/>
+                  <a:cs typeface="Courier" charset="0"/>
+                </a:rPr>
+                <a:t>time</a:t>
+              </a:r>
+              <a:r>
+                <a:rPr lang="en-US" sz="1200" dirty="0" smtClean="0">
+                  <a:solidFill>
+                    <a:schemeClr val="tx1"/>
+                  </a:solidFill>
+                  <a:latin typeface="Courier" charset="0"/>
+                  <a:cs typeface="Courier" charset="0"/>
+                </a:rPr>
+                <a:t>”&gt;</a:t>
+              </a:r>
+            </a:p>
+            <a:p>
+              <a:pPr eaLnBrk="1" hangingPunct="1"/>
+              <a:r>
+                <a:rPr lang="en-US" sz="1200" dirty="0">
+                  <a:solidFill>
+                    <a:schemeClr val="tx1"/>
+                  </a:solidFill>
+                  <a:latin typeface="Courier" charset="0"/>
+                  <a:cs typeface="Courier" charset="0"/>
+                </a:rPr>
+                <a:t> </a:t>
+              </a:r>
+              <a:r>
+                <a:rPr lang="en-US" sz="1200" dirty="0" smtClean="0">
+                  <a:solidFill>
+                    <a:schemeClr val="tx1"/>
+                  </a:solidFill>
+                  <a:latin typeface="Courier" charset="0"/>
+                  <a:cs typeface="Courier" charset="0"/>
+                </a:rPr>
+                <a:t>       &lt;</a:t>
+              </a:r>
+              <a:r>
+                <a:rPr lang="en-US" sz="1200" dirty="0">
+                  <a:solidFill>
+                    <a:schemeClr val="tx1"/>
+                  </a:solidFill>
+                  <a:latin typeface="Courier" charset="0"/>
+                  <a:cs typeface="Courier" charset="0"/>
+                </a:rPr>
+                <a:t>Doc</a:t>
+              </a:r>
+              <a:r>
+                <a:rPr lang="en-US" sz="1200" dirty="0" smtClean="0">
+                  <a:solidFill>
+                    <a:schemeClr val="tx1"/>
+                  </a:solidFill>
+                  <a:latin typeface="Courier" charset="0"/>
+                  <a:cs typeface="Courier" charset="0"/>
+                </a:rPr>
+                <a:t>&gt;</a:t>
+              </a:r>
+            </a:p>
+            <a:p>
+              <a:pPr eaLnBrk="1" hangingPunct="1"/>
+              <a:r>
+                <a:rPr lang="en-US" sz="1200" dirty="0">
+                  <a:solidFill>
+                    <a:schemeClr val="tx1"/>
+                  </a:solidFill>
+                  <a:latin typeface="Courier" charset="0"/>
+                  <a:cs typeface="Courier" charset="0"/>
+                </a:rPr>
+                <a:t> </a:t>
+              </a:r>
+              <a:r>
+                <a:rPr lang="en-US" sz="1200" dirty="0" smtClean="0">
+                  <a:solidFill>
+                    <a:schemeClr val="tx1"/>
+                  </a:solidFill>
+                  <a:latin typeface="Courier" charset="0"/>
+                  <a:cs typeface="Courier" charset="0"/>
+                </a:rPr>
+                <a:t>         Indicates </a:t>
+              </a:r>
+              <a:r>
+                <a:rPr lang="en-US" sz="1200" dirty="0">
+                  <a:solidFill>
+                    <a:schemeClr val="tx1"/>
+                  </a:solidFill>
+                  <a:latin typeface="Courier" charset="0"/>
+                  <a:cs typeface="Courier" charset="0"/>
+                </a:rPr>
+                <a:t>the time </a:t>
+              </a:r>
+              <a:r>
+                <a:rPr lang="en-US" sz="1200" dirty="0" smtClean="0">
+                  <a:solidFill>
+                    <a:schemeClr val="tx1"/>
+                  </a:solidFill>
+                  <a:latin typeface="Courier" charset="0"/>
+                  <a:cs typeface="Courier" charset="0"/>
+                </a:rPr>
+                <a:t>remaining </a:t>
+              </a:r>
+              <a:r>
+                <a:rPr lang="en-US" sz="1200" dirty="0">
+                  <a:solidFill>
+                    <a:schemeClr val="tx1"/>
+                  </a:solidFill>
+                  <a:latin typeface="Courier" charset="0"/>
+                  <a:cs typeface="Courier" charset="0"/>
+                </a:rPr>
+                <a:t>to complete the current </a:t>
+              </a:r>
+              <a:r>
+                <a:rPr lang="en-US" sz="1200" dirty="0" smtClean="0">
+                  <a:solidFill>
+                    <a:schemeClr val="tx1"/>
+                  </a:solidFill>
+                  <a:latin typeface="Courier" charset="0"/>
+                  <a:cs typeface="Courier" charset="0"/>
+                </a:rPr>
+                <a:t>washing </a:t>
+              </a:r>
+              <a:r>
+                <a:rPr lang="en-US" sz="1200" dirty="0">
+                  <a:solidFill>
+                    <a:schemeClr val="tx1"/>
+                  </a:solidFill>
+                  <a:latin typeface="Courier" charset="0"/>
+                  <a:cs typeface="Courier" charset="0"/>
+                </a:rPr>
+                <a:t>cycle </a:t>
+              </a:r>
+              <a:r>
+                <a:rPr lang="en-US" sz="1200" dirty="0" smtClean="0">
+                  <a:solidFill>
+                    <a:schemeClr val="tx1"/>
+                  </a:solidFill>
+                  <a:latin typeface="Courier" charset="0"/>
+                  <a:cs typeface="Courier" charset="0"/>
+                </a:rPr>
+                <a:t>in</a:t>
+              </a:r>
+            </a:p>
+            <a:p>
+              <a:pPr eaLnBrk="1" hangingPunct="1"/>
+              <a:r>
+                <a:rPr lang="en-US" sz="1200" dirty="0">
+                  <a:solidFill>
+                    <a:schemeClr val="tx1"/>
+                  </a:solidFill>
+                  <a:latin typeface="Courier" charset="0"/>
+                  <a:cs typeface="Courier" charset="0"/>
+                </a:rPr>
+                <a:t> </a:t>
+              </a:r>
+              <a:r>
+                <a:rPr lang="en-US" sz="1200" dirty="0" smtClean="0">
+                  <a:solidFill>
+                    <a:schemeClr val="tx1"/>
+                  </a:solidFill>
+                  <a:latin typeface="Courier" charset="0"/>
+                  <a:cs typeface="Courier" charset="0"/>
+                </a:rPr>
+                <a:t>         </a:t>
+              </a:r>
+              <a:r>
+                <a:rPr lang="en-US" sz="1200" dirty="0">
+                  <a:solidFill>
+                    <a:schemeClr val="tx1"/>
+                  </a:solidFill>
+                  <a:latin typeface="Courier" charset="0"/>
+                  <a:cs typeface="Courier" charset="0"/>
+                </a:rPr>
+                <a:t>the </a:t>
+              </a:r>
+              <a:r>
+                <a:rPr lang="en-US" sz="1200" dirty="0" smtClean="0">
+                  <a:solidFill>
+                    <a:schemeClr val="tx1"/>
+                  </a:solidFill>
+                  <a:latin typeface="Courier" charset="0"/>
+                  <a:cs typeface="Courier" charset="0"/>
+                </a:rPr>
+                <a:t>HH:MM:SS format.</a:t>
+              </a:r>
+            </a:p>
+            <a:p>
+              <a:pPr eaLnBrk="1" hangingPunct="1"/>
+              <a:r>
+                <a:rPr lang="en-US" sz="1200" dirty="0">
+                  <a:solidFill>
+                    <a:schemeClr val="tx1"/>
+                  </a:solidFill>
+                  <a:latin typeface="Courier" charset="0"/>
+                  <a:cs typeface="Courier" charset="0"/>
+                </a:rPr>
+                <a:t> </a:t>
+              </a:r>
+              <a:r>
+                <a:rPr lang="en-US" sz="1200" dirty="0" smtClean="0">
+                  <a:solidFill>
+                    <a:schemeClr val="tx1"/>
+                  </a:solidFill>
+                  <a:latin typeface="Courier" charset="0"/>
+                  <a:cs typeface="Courier" charset="0"/>
+                </a:rPr>
+                <a:t>       &lt;</a:t>
+              </a:r>
+              <a:r>
+                <a:rPr lang="en-US" sz="1200" dirty="0">
+                  <a:solidFill>
+                    <a:schemeClr val="tx1"/>
+                  </a:solidFill>
+                  <a:latin typeface="Courier" charset="0"/>
+                  <a:cs typeface="Courier" charset="0"/>
+                </a:rPr>
+                <a:t>/Doc&gt;</a:t>
+              </a:r>
+              <a:endParaRPr lang="en-US" sz="1200" dirty="0" smtClean="0">
+                <a:solidFill>
+                  <a:schemeClr val="tx1"/>
+                </a:solidFill>
+                <a:latin typeface="Courier" charset="0"/>
+                <a:cs typeface="Courier" charset="0"/>
+              </a:endParaRPr>
+            </a:p>
+            <a:p>
+              <a:pPr eaLnBrk="1" hangingPunct="1"/>
+              <a:r>
+                <a:rPr lang="en-US" sz="1200" dirty="0">
+                  <a:solidFill>
+                    <a:schemeClr val="tx1"/>
+                  </a:solidFill>
+                  <a:latin typeface="Courier" charset="0"/>
+                  <a:cs typeface="Courier" charset="0"/>
+                </a:rPr>
+                <a:t>	 &lt;/</a:t>
+              </a:r>
+              <a:r>
+                <a:rPr lang="en-US" sz="1200" dirty="0" err="1">
+                  <a:solidFill>
+                    <a:schemeClr val="tx1"/>
+                  </a:solidFill>
+                  <a:latin typeface="Courier" charset="0"/>
+                  <a:cs typeface="Courier" charset="0"/>
+                </a:rPr>
+                <a:t>DataPoint</a:t>
+              </a:r>
+              <a:r>
+                <a:rPr lang="en-US" sz="1200" dirty="0">
+                  <a:solidFill>
+                    <a:schemeClr val="tx1"/>
+                  </a:solidFill>
+                  <a:latin typeface="Courier" charset="0"/>
+                  <a:cs typeface="Courier" charset="0"/>
+                </a:rPr>
+                <a:t>/&gt;</a:t>
+              </a:r>
+            </a:p>
+            <a:p>
+              <a:pPr eaLnBrk="1" hangingPunct="1"/>
+              <a:r>
+                <a:rPr lang="en-US" sz="1200" dirty="0" smtClean="0">
+                  <a:solidFill>
+                    <a:schemeClr val="tx1"/>
+                  </a:solidFill>
+                  <a:latin typeface="Courier" charset="0"/>
+                  <a:cs typeface="Courier" charset="0"/>
+                </a:rPr>
+                <a:t>      </a:t>
+              </a:r>
+              <a:r>
+                <a:rPr lang="en-US" sz="1200" dirty="0" smtClean="0">
+                  <a:solidFill>
+                    <a:schemeClr val="tx1"/>
+                  </a:solidFill>
+                  <a:latin typeface="Courier" charset="0"/>
+                  <a:cs typeface="Courier" charset="0"/>
+                </a:rPr>
+                <a:t>&lt;</a:t>
+              </a:r>
+              <a:r>
+                <a:rPr lang="en-US" sz="1200" dirty="0" err="1">
+                  <a:solidFill>
+                    <a:schemeClr val="tx1"/>
+                  </a:solidFill>
+                  <a:latin typeface="Courier" charset="0"/>
+                  <a:cs typeface="Courier" charset="0"/>
+                </a:rPr>
+                <a:t>DataPoint</a:t>
+              </a:r>
+              <a:r>
+                <a:rPr lang="en-US" sz="1200" dirty="0">
+                  <a:solidFill>
+                    <a:schemeClr val="tx1"/>
+                  </a:solidFill>
+                  <a:latin typeface="Courier" charset="0"/>
+                  <a:cs typeface="Courier" charset="0"/>
+                </a:rPr>
+                <a:t> name=</a:t>
+              </a:r>
+              <a:r>
+                <a:rPr lang="en-US" sz="1200" dirty="0" smtClean="0">
+                  <a:solidFill>
+                    <a:schemeClr val="tx1"/>
+                  </a:solidFill>
+                  <a:latin typeface="Courier" charset="0"/>
+                  <a:cs typeface="Courier" charset="0"/>
+                </a:rPr>
+                <a:t>“</a:t>
+              </a:r>
+              <a:r>
+                <a:rPr lang="en-US" sz="1200" b="1" dirty="0" err="1" smtClean="0">
+                  <a:solidFill>
+                    <a:schemeClr val="tx1"/>
+                  </a:solidFill>
+                  <a:latin typeface="Courier" charset="0"/>
+                  <a:cs typeface="Courier" charset="0"/>
+                </a:rPr>
+                <a:t>onTimerReservationSetting</a:t>
+              </a:r>
+              <a:r>
+                <a:rPr lang="en-US" sz="1200" dirty="0" smtClean="0">
+                  <a:solidFill>
+                    <a:schemeClr val="tx1"/>
+                  </a:solidFill>
+                  <a:latin typeface="Courier" charset="0"/>
+                  <a:cs typeface="Courier" charset="0"/>
+                </a:rPr>
+                <a:t>” </a:t>
+              </a:r>
+              <a:r>
+                <a:rPr lang="en-US" sz="1200" dirty="0">
+                  <a:solidFill>
+                    <a:schemeClr val="tx1"/>
+                  </a:solidFill>
+                  <a:latin typeface="Courier" charset="0"/>
+                  <a:cs typeface="Courier" charset="0"/>
+                </a:rPr>
+                <a:t>type=</a:t>
+              </a:r>
+              <a:r>
+                <a:rPr lang="en-US" sz="1200" dirty="0" smtClean="0">
+                  <a:solidFill>
+                    <a:schemeClr val="tx1"/>
+                  </a:solidFill>
+                  <a:latin typeface="Courier" charset="0"/>
+                  <a:cs typeface="Courier" charset="0"/>
+                </a:rPr>
+                <a:t>“</a:t>
+              </a:r>
+              <a:r>
+                <a:rPr lang="en-US" sz="1200" b="1" dirty="0" err="1" smtClean="0">
+                  <a:solidFill>
+                    <a:schemeClr val="tx1"/>
+                  </a:solidFill>
+                  <a:latin typeface="Courier" charset="0"/>
+                  <a:cs typeface="Courier" charset="0"/>
+                </a:rPr>
+                <a:t>boolean</a:t>
+              </a:r>
+              <a:r>
+                <a:rPr lang="en-US" sz="1200" dirty="0" smtClean="0">
+                  <a:solidFill>
+                    <a:schemeClr val="tx1"/>
+                  </a:solidFill>
+                  <a:latin typeface="Courier" charset="0"/>
+                  <a:cs typeface="Courier" charset="0"/>
+                </a:rPr>
+                <a:t>” </a:t>
+              </a:r>
+              <a:r>
+                <a:rPr lang="en-US" sz="1200" dirty="0">
+                  <a:solidFill>
+                    <a:schemeClr val="tx1"/>
+                  </a:solidFill>
+                  <a:latin typeface="Courier" charset="0"/>
+                  <a:cs typeface="Courier" charset="0"/>
+                </a:rPr>
+                <a:t>writable=“</a:t>
+              </a:r>
+              <a:r>
+                <a:rPr lang="en-US" sz="1200" b="1" dirty="0">
+                  <a:solidFill>
+                    <a:schemeClr val="tx1"/>
+                  </a:solidFill>
+                  <a:latin typeface="Courier" charset="0"/>
+                  <a:cs typeface="Courier" charset="0"/>
+                </a:rPr>
+                <a:t>true</a:t>
+              </a:r>
+              <a:r>
+                <a:rPr lang="en-US" sz="1200" dirty="0" smtClean="0">
+                  <a:solidFill>
+                    <a:schemeClr val="tx1"/>
+                  </a:solidFill>
+                  <a:latin typeface="Courier" charset="0"/>
+                  <a:cs typeface="Courier" charset="0"/>
+                </a:rPr>
+                <a:t>”&gt;</a:t>
+              </a:r>
+            </a:p>
+            <a:p>
+              <a:pPr eaLnBrk="1" hangingPunct="1"/>
+              <a:r>
+                <a:rPr lang="en-US" sz="1200" dirty="0">
+                  <a:solidFill>
+                    <a:schemeClr val="tx1"/>
+                  </a:solidFill>
+                  <a:latin typeface="Courier" charset="0"/>
+                  <a:cs typeface="Courier" charset="0"/>
+                </a:rPr>
+                <a:t> </a:t>
+              </a:r>
+              <a:r>
+                <a:rPr lang="en-US" sz="1200" dirty="0" smtClean="0">
+                  <a:solidFill>
+                    <a:schemeClr val="tx1"/>
+                  </a:solidFill>
+                  <a:latin typeface="Courier" charset="0"/>
+                  <a:cs typeface="Courier" charset="0"/>
+                </a:rPr>
+                <a:t>       &lt;</a:t>
+              </a:r>
+              <a:r>
+                <a:rPr lang="en-US" sz="1200" dirty="0">
+                  <a:solidFill>
+                    <a:schemeClr val="tx1"/>
+                  </a:solidFill>
+                  <a:latin typeface="Courier" charset="0"/>
+                  <a:cs typeface="Courier" charset="0"/>
+                </a:rPr>
+                <a:t>Doc&gt;</a:t>
+              </a:r>
+            </a:p>
+            <a:p>
+              <a:pPr eaLnBrk="1" hangingPunct="1"/>
+              <a:r>
+                <a:rPr lang="en-US" sz="1200" dirty="0">
+                  <a:solidFill>
+                    <a:schemeClr val="tx1"/>
+                  </a:solidFill>
+                  <a:latin typeface="Courier" charset="0"/>
+                  <a:cs typeface="Courier" charset="0"/>
+                </a:rPr>
+                <a:t>          Reservation ON/</a:t>
+              </a:r>
+              <a:r>
+                <a:rPr lang="en-US" sz="1200" dirty="0" smtClean="0">
+                  <a:solidFill>
+                    <a:schemeClr val="tx1"/>
+                  </a:solidFill>
+                  <a:latin typeface="Courier" charset="0"/>
+                  <a:cs typeface="Courier" charset="0"/>
+                </a:rPr>
+                <a:t>OFF.</a:t>
+              </a:r>
+            </a:p>
+            <a:p>
+              <a:pPr eaLnBrk="1" hangingPunct="1"/>
+              <a:r>
+                <a:rPr lang="en-US" sz="1200" dirty="0" smtClean="0">
+                  <a:solidFill>
+                    <a:schemeClr val="tx1"/>
+                  </a:solidFill>
+                  <a:latin typeface="Courier" charset="0"/>
+                  <a:cs typeface="Courier" charset="0"/>
+                </a:rPr>
+                <a:t>        </a:t>
+              </a:r>
+              <a:r>
+                <a:rPr lang="en-US" sz="1200" dirty="0">
+                  <a:solidFill>
+                    <a:schemeClr val="tx1"/>
+                  </a:solidFill>
+                  <a:latin typeface="Courier" charset="0"/>
+                  <a:cs typeface="Courier" charset="0"/>
+                </a:rPr>
+                <a:t>&lt;/Doc&gt;</a:t>
+              </a:r>
+              <a:endParaRPr lang="en-US" sz="1200" dirty="0" smtClean="0">
+                <a:solidFill>
+                  <a:schemeClr val="tx1"/>
+                </a:solidFill>
+                <a:latin typeface="Courier" charset="0"/>
+                <a:cs typeface="Courier" charset="0"/>
+              </a:endParaRPr>
+            </a:p>
+            <a:p>
+              <a:pPr eaLnBrk="1" hangingPunct="1"/>
+              <a:r>
+                <a:rPr lang="en-US" sz="1200" dirty="0">
+                  <a:solidFill>
+                    <a:schemeClr val="tx1"/>
+                  </a:solidFill>
+                  <a:latin typeface="Courier" charset="0"/>
+                  <a:cs typeface="Courier" charset="0"/>
+                </a:rPr>
+                <a:t>	 &lt;/</a:t>
+              </a:r>
+              <a:r>
+                <a:rPr lang="en-US" sz="1200" dirty="0" err="1">
+                  <a:solidFill>
+                    <a:schemeClr val="tx1"/>
+                  </a:solidFill>
+                  <a:latin typeface="Courier" charset="0"/>
+                  <a:cs typeface="Courier" charset="0"/>
+                </a:rPr>
+                <a:t>DataPoint</a:t>
+              </a:r>
+              <a:r>
+                <a:rPr lang="en-US" sz="1200" dirty="0">
+                  <a:solidFill>
+                    <a:schemeClr val="tx1"/>
+                  </a:solidFill>
+                  <a:latin typeface="Courier" charset="0"/>
+                  <a:cs typeface="Courier" charset="0"/>
+                </a:rPr>
+                <a:t>/&gt;</a:t>
+              </a:r>
+            </a:p>
+            <a:p>
+              <a:pPr eaLnBrk="1" hangingPunct="1"/>
+              <a:r>
+                <a:rPr lang="en-US" sz="1200" dirty="0" smtClean="0">
+                  <a:solidFill>
+                    <a:schemeClr val="tx1"/>
+                  </a:solidFill>
+                  <a:latin typeface="Courier" charset="0"/>
+                  <a:cs typeface="Courier" charset="0"/>
+                </a:rPr>
+                <a:t>      &lt;</a:t>
+              </a:r>
+              <a:r>
+                <a:rPr lang="en-US" sz="1200" dirty="0" err="1" smtClean="0">
+                  <a:solidFill>
+                    <a:schemeClr val="tx1"/>
+                  </a:solidFill>
+                  <a:latin typeface="Courier" charset="0"/>
+                  <a:cs typeface="Courier" charset="0"/>
+                </a:rPr>
+                <a:t>DataPoint</a:t>
+              </a:r>
+              <a:r>
+                <a:rPr lang="en-US" sz="1200" dirty="0" smtClean="0">
+                  <a:solidFill>
+                    <a:schemeClr val="tx1"/>
+                  </a:solidFill>
+                  <a:latin typeface="Courier" charset="0"/>
+                  <a:cs typeface="Courier" charset="0"/>
+                </a:rPr>
+                <a:t> name=“</a:t>
+              </a:r>
+              <a:r>
+                <a:rPr lang="en-US" sz="1200" b="1" dirty="0" err="1" smtClean="0">
+                  <a:solidFill>
+                    <a:schemeClr val="tx1"/>
+                  </a:solidFill>
+                  <a:latin typeface="Courier" charset="0"/>
+                  <a:cs typeface="Courier" charset="0"/>
+                </a:rPr>
+                <a:t>onTimerSetting</a:t>
+              </a:r>
+              <a:r>
+                <a:rPr lang="en-US" sz="1200" dirty="0" smtClean="0">
+                  <a:solidFill>
+                    <a:schemeClr val="tx1"/>
+                  </a:solidFill>
+                  <a:latin typeface="Courier" charset="0"/>
+                  <a:cs typeface="Courier" charset="0"/>
+                </a:rPr>
+                <a:t>” type=“</a:t>
+              </a:r>
+              <a:r>
+                <a:rPr lang="en-US" sz="1200" b="1" dirty="0" smtClean="0">
+                  <a:solidFill>
+                    <a:schemeClr val="tx1"/>
+                  </a:solidFill>
+                  <a:latin typeface="Courier" charset="0"/>
+                  <a:cs typeface="Courier" charset="0"/>
+                </a:rPr>
+                <a:t>time</a:t>
+              </a:r>
+              <a:r>
+                <a:rPr lang="en-US" sz="1200" dirty="0" smtClean="0">
+                  <a:solidFill>
+                    <a:schemeClr val="tx1"/>
+                  </a:solidFill>
+                  <a:latin typeface="Courier" charset="0"/>
+                  <a:cs typeface="Courier" charset="0"/>
+                </a:rPr>
+                <a:t>” writable=“</a:t>
+              </a:r>
+              <a:r>
+                <a:rPr lang="en-US" sz="1200" b="1" dirty="0" smtClean="0">
+                  <a:solidFill>
+                    <a:schemeClr val="tx1"/>
+                  </a:solidFill>
+                  <a:latin typeface="Courier" charset="0"/>
+                  <a:cs typeface="Courier" charset="0"/>
+                </a:rPr>
+                <a:t>true</a:t>
+              </a:r>
+              <a:r>
+                <a:rPr lang="en-US" sz="1200" dirty="0" smtClean="0">
+                  <a:solidFill>
+                    <a:schemeClr val="tx1"/>
+                  </a:solidFill>
+                  <a:latin typeface="Courier" charset="0"/>
+                  <a:cs typeface="Courier" charset="0"/>
+                </a:rPr>
+                <a:t>”&gt;</a:t>
+              </a:r>
+            </a:p>
+            <a:p>
+              <a:pPr eaLnBrk="1" hangingPunct="1"/>
+              <a:r>
+                <a:rPr lang="en-US" sz="1200" dirty="0">
+                  <a:solidFill>
+                    <a:schemeClr val="tx1"/>
+                  </a:solidFill>
+                  <a:latin typeface="Courier" charset="0"/>
+                  <a:cs typeface="Courier" charset="0"/>
+                </a:rPr>
+                <a:t> </a:t>
+              </a:r>
+              <a:r>
+                <a:rPr lang="en-US" sz="1200" dirty="0" smtClean="0">
+                  <a:solidFill>
+                    <a:schemeClr val="tx1"/>
+                  </a:solidFill>
+                  <a:latin typeface="Courier" charset="0"/>
+                  <a:cs typeface="Courier" charset="0"/>
+                </a:rPr>
+                <a:t>       &lt;</a:t>
+              </a:r>
+              <a:r>
+                <a:rPr lang="en-US" sz="1200" dirty="0">
+                  <a:solidFill>
+                    <a:schemeClr val="tx1"/>
+                  </a:solidFill>
+                  <a:latin typeface="Courier" charset="0"/>
+                  <a:cs typeface="Courier" charset="0"/>
+                </a:rPr>
+                <a:t>Doc&gt;</a:t>
+              </a:r>
+            </a:p>
+            <a:p>
+              <a:pPr eaLnBrk="1" hangingPunct="1"/>
+              <a:r>
+                <a:rPr lang="en-US" sz="1200" dirty="0">
+                  <a:solidFill>
+                    <a:schemeClr val="tx1"/>
+                  </a:solidFill>
+                  <a:latin typeface="Courier" charset="0"/>
+                  <a:cs typeface="Courier" charset="0"/>
+                </a:rPr>
+                <a:t>          Timer value (HH:MM).</a:t>
+              </a:r>
+            </a:p>
+            <a:p>
+              <a:pPr eaLnBrk="1" hangingPunct="1"/>
+              <a:r>
+                <a:rPr lang="en-US" sz="1200" dirty="0">
+                  <a:solidFill>
+                    <a:schemeClr val="tx1"/>
+                  </a:solidFill>
+                  <a:latin typeface="Courier" charset="0"/>
+                  <a:cs typeface="Courier" charset="0"/>
+                </a:rPr>
+                <a:t>        &lt;/Doc&gt;</a:t>
+              </a:r>
+              <a:endParaRPr lang="en-US" sz="1200" dirty="0" smtClean="0">
+                <a:solidFill>
+                  <a:schemeClr val="tx1"/>
+                </a:solidFill>
+                <a:latin typeface="Courier" charset="0"/>
+                <a:cs typeface="Courier" charset="0"/>
+              </a:endParaRPr>
+            </a:p>
+            <a:p>
+              <a:pPr eaLnBrk="1" hangingPunct="1"/>
+              <a:r>
+                <a:rPr lang="en-US" sz="1200" dirty="0">
+                  <a:solidFill>
+                    <a:schemeClr val="tx1"/>
+                  </a:solidFill>
+                  <a:latin typeface="Courier" charset="0"/>
+                  <a:cs typeface="Courier" charset="0"/>
+                </a:rPr>
+                <a:t>	 &lt;/</a:t>
+              </a:r>
+              <a:r>
+                <a:rPr lang="en-US" sz="1200" dirty="0" err="1">
+                  <a:solidFill>
+                    <a:schemeClr val="tx1"/>
+                  </a:solidFill>
+                  <a:latin typeface="Courier" charset="0"/>
+                  <a:cs typeface="Courier" charset="0"/>
+                </a:rPr>
+                <a:t>DataPoint</a:t>
+              </a:r>
+              <a:r>
+                <a:rPr lang="en-US" sz="1200" dirty="0">
+                  <a:solidFill>
+                    <a:schemeClr val="tx1"/>
+                  </a:solidFill>
+                  <a:latin typeface="Courier" charset="0"/>
+                  <a:cs typeface="Courier" charset="0"/>
+                </a:rPr>
+                <a:t>/&gt;</a:t>
+              </a:r>
+            </a:p>
+            <a:p>
+              <a:pPr eaLnBrk="1" hangingPunct="1"/>
+              <a:r>
+                <a:rPr lang="en-US" sz="1200" dirty="0" smtClean="0">
+                  <a:solidFill>
+                    <a:schemeClr val="tx1"/>
+                  </a:solidFill>
+                  <a:latin typeface="Courier" charset="0"/>
+                  <a:cs typeface="Courier" charset="0"/>
+                </a:rPr>
+                <a:t>      </a:t>
+              </a:r>
+              <a:r>
+                <a:rPr lang="en-US" sz="1200" dirty="0" smtClean="0">
+                  <a:solidFill>
+                    <a:schemeClr val="tx1"/>
+                  </a:solidFill>
+                  <a:latin typeface="Courier" charset="0"/>
+                  <a:cs typeface="Courier" charset="0"/>
+                </a:rPr>
+                <a:t>&lt;</a:t>
+              </a:r>
+              <a:r>
+                <a:rPr lang="en-US" sz="1200" dirty="0" err="1">
+                  <a:solidFill>
+                    <a:schemeClr val="tx1"/>
+                  </a:solidFill>
+                  <a:latin typeface="Courier" charset="0"/>
+                  <a:cs typeface="Courier" charset="0"/>
+                </a:rPr>
+                <a:t>DataPoint</a:t>
+              </a:r>
+              <a:r>
+                <a:rPr lang="en-US" sz="1200" dirty="0">
+                  <a:solidFill>
+                    <a:schemeClr val="tx1"/>
+                  </a:solidFill>
+                  <a:latin typeface="Courier" charset="0"/>
+                  <a:cs typeface="Courier" charset="0"/>
+                </a:rPr>
+                <a:t> name=</a:t>
+              </a:r>
+              <a:r>
+                <a:rPr lang="en-US" sz="1200" dirty="0" smtClean="0">
+                  <a:solidFill>
+                    <a:schemeClr val="tx1"/>
+                  </a:solidFill>
+                  <a:latin typeface="Courier" charset="0"/>
+                  <a:cs typeface="Courier" charset="0"/>
+                </a:rPr>
+                <a:t>“</a:t>
+              </a:r>
+              <a:r>
+                <a:rPr lang="en-US" sz="1200" b="1" dirty="0" err="1" smtClean="0">
+                  <a:solidFill>
+                    <a:schemeClr val="tx1"/>
+                  </a:solidFill>
+                  <a:latin typeface="Courier" charset="0"/>
+                  <a:cs typeface="Courier" charset="0"/>
+                </a:rPr>
+                <a:t>relativeOnTimeBasedTimerSetting</a:t>
+              </a:r>
+              <a:r>
+                <a:rPr lang="en-US" sz="1200" dirty="0" smtClean="0">
+                  <a:solidFill>
+                    <a:schemeClr val="tx1"/>
+                  </a:solidFill>
+                  <a:latin typeface="Courier" charset="0"/>
+                  <a:cs typeface="Courier" charset="0"/>
+                </a:rPr>
+                <a:t>” </a:t>
+              </a:r>
+              <a:r>
+                <a:rPr lang="en-US" sz="1200" dirty="0">
+                  <a:solidFill>
+                    <a:schemeClr val="tx1"/>
+                  </a:solidFill>
+                  <a:latin typeface="Courier" charset="0"/>
+                  <a:cs typeface="Courier" charset="0"/>
+                </a:rPr>
+                <a:t>type=</a:t>
+              </a:r>
+              <a:r>
+                <a:rPr lang="en-US" sz="1200" dirty="0" smtClean="0">
+                  <a:solidFill>
+                    <a:schemeClr val="tx1"/>
+                  </a:solidFill>
+                  <a:latin typeface="Courier" charset="0"/>
+                  <a:cs typeface="Courier" charset="0"/>
+                </a:rPr>
+                <a:t>“</a:t>
+              </a:r>
+              <a:r>
+                <a:rPr lang="en-US" sz="1200" b="1" dirty="0" smtClean="0">
+                  <a:solidFill>
+                    <a:schemeClr val="tx1"/>
+                  </a:solidFill>
+                  <a:latin typeface="Courier" charset="0"/>
+                  <a:cs typeface="Courier" charset="0"/>
+                </a:rPr>
+                <a:t>time</a:t>
+              </a:r>
+              <a:r>
+                <a:rPr lang="en-US" sz="1200" dirty="0" smtClean="0">
+                  <a:solidFill>
+                    <a:schemeClr val="tx1"/>
+                  </a:solidFill>
+                  <a:latin typeface="Courier" charset="0"/>
+                  <a:cs typeface="Courier" charset="0"/>
+                </a:rPr>
+                <a:t>” </a:t>
+              </a:r>
+              <a:r>
+                <a:rPr lang="en-US" sz="1200" dirty="0">
+                  <a:solidFill>
+                    <a:schemeClr val="tx1"/>
+                  </a:solidFill>
+                  <a:latin typeface="Courier" charset="0"/>
+                  <a:cs typeface="Courier" charset="0"/>
+                </a:rPr>
+                <a:t>writable=“</a:t>
+              </a:r>
+              <a:r>
+                <a:rPr lang="en-US" sz="1200" b="1" dirty="0">
+                  <a:solidFill>
+                    <a:schemeClr val="tx1"/>
+                  </a:solidFill>
+                  <a:latin typeface="Courier" charset="0"/>
+                  <a:cs typeface="Courier" charset="0"/>
+                </a:rPr>
+                <a:t>true</a:t>
+              </a:r>
+              <a:r>
+                <a:rPr lang="en-US" sz="1200" dirty="0" smtClean="0">
+                  <a:solidFill>
+                    <a:schemeClr val="tx1"/>
+                  </a:solidFill>
+                  <a:latin typeface="Courier" charset="0"/>
+                  <a:cs typeface="Courier" charset="0"/>
+                </a:rPr>
+                <a:t>”&gt;</a:t>
+              </a:r>
+            </a:p>
+            <a:p>
+              <a:pPr eaLnBrk="1" hangingPunct="1"/>
+              <a:r>
+                <a:rPr lang="en-US" sz="1200" dirty="0">
+                  <a:solidFill>
+                    <a:schemeClr val="tx1"/>
+                  </a:solidFill>
+                  <a:latin typeface="Courier" charset="0"/>
+                  <a:cs typeface="Courier" charset="0"/>
+                </a:rPr>
+                <a:t> </a:t>
+              </a:r>
+              <a:r>
+                <a:rPr lang="en-US" sz="1200" dirty="0" smtClean="0">
+                  <a:solidFill>
+                    <a:schemeClr val="tx1"/>
+                  </a:solidFill>
+                  <a:latin typeface="Courier" charset="0"/>
+                  <a:cs typeface="Courier" charset="0"/>
+                </a:rPr>
+                <a:t>       &lt;</a:t>
+              </a:r>
+              <a:r>
+                <a:rPr lang="en-US" sz="1200" dirty="0">
+                  <a:solidFill>
+                    <a:schemeClr val="tx1"/>
+                  </a:solidFill>
+                  <a:latin typeface="Courier" charset="0"/>
+                  <a:cs typeface="Courier" charset="0"/>
+                </a:rPr>
+                <a:t>Doc&gt;</a:t>
+              </a:r>
+            </a:p>
+            <a:p>
+              <a:pPr eaLnBrk="1" hangingPunct="1"/>
+              <a:r>
+                <a:rPr lang="en-US" sz="1200" dirty="0">
+                  <a:solidFill>
+                    <a:schemeClr val="tx1"/>
+                  </a:solidFill>
+                  <a:latin typeface="Courier" charset="0"/>
+                  <a:cs typeface="Courier" charset="0"/>
+                </a:rPr>
+                <a:t>          Timer value (HH:MM).</a:t>
+              </a:r>
+            </a:p>
+            <a:p>
+              <a:pPr eaLnBrk="1" hangingPunct="1"/>
+              <a:r>
+                <a:rPr lang="en-US" sz="1200" dirty="0">
+                  <a:solidFill>
+                    <a:schemeClr val="tx1"/>
+                  </a:solidFill>
+                  <a:latin typeface="Courier" charset="0"/>
+                  <a:cs typeface="Courier" charset="0"/>
+                </a:rPr>
+                <a:t>        &lt;/Doc&gt;</a:t>
+              </a:r>
+              <a:endParaRPr lang="en-US" sz="1200" dirty="0" smtClean="0">
+                <a:solidFill>
+                  <a:schemeClr val="tx1"/>
+                </a:solidFill>
+                <a:latin typeface="Courier" charset="0"/>
+                <a:cs typeface="Courier" charset="0"/>
+              </a:endParaRPr>
+            </a:p>
+            <a:p>
+              <a:pPr eaLnBrk="1" hangingPunct="1"/>
+              <a:r>
+                <a:rPr lang="en-US" sz="1200" dirty="0">
+                  <a:solidFill>
+                    <a:schemeClr val="tx1"/>
+                  </a:solidFill>
+                  <a:latin typeface="Courier" charset="0"/>
+                  <a:cs typeface="Courier" charset="0"/>
+                </a:rPr>
+                <a:t>	 &lt;/</a:t>
+              </a:r>
+              <a:r>
+                <a:rPr lang="en-US" sz="1200" dirty="0" err="1">
+                  <a:solidFill>
+                    <a:schemeClr val="tx1"/>
+                  </a:solidFill>
+                  <a:latin typeface="Courier" charset="0"/>
+                  <a:cs typeface="Courier" charset="0"/>
+                </a:rPr>
+                <a:t>DataPoint</a:t>
+              </a:r>
+              <a:r>
+                <a:rPr lang="en-US" sz="1200" dirty="0">
+                  <a:solidFill>
+                    <a:schemeClr val="tx1"/>
+                  </a:solidFill>
+                  <a:latin typeface="Courier" charset="0"/>
+                  <a:cs typeface="Courier" charset="0"/>
+                </a:rPr>
+                <a:t>/&gt;</a:t>
+              </a:r>
+            </a:p>
+            <a:p>
+              <a:pPr eaLnBrk="1" hangingPunct="1"/>
+              <a:r>
+                <a:rPr lang="en-US" sz="1200" dirty="0" smtClean="0">
+                  <a:solidFill>
+                    <a:schemeClr val="tx1"/>
+                  </a:solidFill>
+                  <a:latin typeface="Courier" charset="0"/>
+                  <a:cs typeface="Courier" charset="0"/>
+                </a:rPr>
+                <a:t>    </a:t>
+              </a:r>
+              <a:r>
+                <a:rPr lang="en-US" sz="1200" dirty="0" smtClean="0">
+                  <a:solidFill>
+                    <a:schemeClr val="tx1"/>
+                  </a:solidFill>
+                  <a:latin typeface="Courier" charset="0"/>
+                  <a:cs typeface="Courier" charset="0"/>
+                </a:rPr>
+                <a:t>&lt;</a:t>
+              </a:r>
+              <a:r>
+                <a:rPr lang="en-US" sz="1200" dirty="0">
+                  <a:solidFill>
+                    <a:schemeClr val="tx1"/>
+                  </a:solidFill>
+                  <a:latin typeface="Courier" charset="0"/>
+                  <a:cs typeface="Courier" charset="0"/>
+                </a:rPr>
+                <a:t>/Data</a:t>
+              </a:r>
+              <a:r>
+                <a:rPr lang="en-US" sz="1200" dirty="0" smtClean="0">
+                  <a:solidFill>
+                    <a:schemeClr val="tx1"/>
+                  </a:solidFill>
+                  <a:latin typeface="Courier" charset="0"/>
+                  <a:cs typeface="Courier" charset="0"/>
+                </a:rPr>
+                <a:t>&gt;</a:t>
+              </a:r>
+            </a:p>
+            <a:p>
+              <a:pPr eaLnBrk="1" hangingPunct="1"/>
+              <a:r>
+                <a:rPr lang="en-US" sz="1200" dirty="0" smtClean="0">
+                  <a:solidFill>
+                    <a:schemeClr val="tx1"/>
+                  </a:solidFill>
+                  <a:latin typeface="Courier" charset="0"/>
+                  <a:cs typeface="Courier" charset="0"/>
+                </a:rPr>
+                <a:t>  &lt;</a:t>
+              </a:r>
+              <a:r>
+                <a:rPr lang="en-US" sz="1200" dirty="0">
+                  <a:solidFill>
+                    <a:schemeClr val="tx1"/>
+                  </a:solidFill>
+                  <a:latin typeface="Courier" charset="0"/>
+                  <a:cs typeface="Courier" charset="0"/>
+                </a:rPr>
+                <a:t>/</a:t>
+              </a:r>
+              <a:r>
+                <a:rPr lang="en-US" sz="1200" dirty="0" err="1">
+                  <a:solidFill>
+                    <a:schemeClr val="tx1"/>
+                  </a:solidFill>
+                  <a:latin typeface="Courier" charset="0"/>
+                  <a:cs typeface="Courier" charset="0"/>
+                </a:rPr>
+                <a:t>ModuleClass</a:t>
+              </a:r>
+              <a:r>
+                <a:rPr lang="en-US" sz="1200" dirty="0" smtClean="0">
+                  <a:solidFill>
+                    <a:schemeClr val="tx1"/>
+                  </a:solidFill>
+                  <a:latin typeface="Courier" charset="0"/>
+                  <a:cs typeface="Courier" charset="0"/>
+                </a:rPr>
+                <a:t>&gt;</a:t>
+              </a:r>
+            </a:p>
+            <a:p>
+              <a:pPr eaLnBrk="1" hangingPunct="1"/>
+              <a:r>
+                <a:rPr lang="en-US" sz="1200" dirty="0" smtClean="0">
+                  <a:solidFill>
+                    <a:schemeClr val="tx1"/>
+                  </a:solidFill>
+                  <a:latin typeface="Courier" charset="0"/>
+                  <a:cs typeface="Courier" charset="0"/>
+                </a:rPr>
+                <a:t>&lt;/Domain&gt;</a:t>
+              </a:r>
+              <a:endParaRPr lang="en-US" sz="1200" dirty="0">
+                <a:solidFill>
+                  <a:schemeClr val="tx1"/>
+                </a:solidFill>
+                <a:latin typeface="Courier" charset="0"/>
+                <a:cs typeface="Courier" charset="0"/>
+              </a:endParaRPr>
+            </a:p>
+          </p:txBody>
+        </p:sp>
+        <p:sp>
+          <p:nvSpPr>
+            <p:cNvPr id="7" name="Round Same Side Corner Rectangle 8"/>
+            <p:cNvSpPr/>
+            <p:nvPr/>
+          </p:nvSpPr>
+          <p:spPr bwMode="auto">
+            <a:xfrm>
+              <a:off x="-2743199" y="-766980"/>
+              <a:ext cx="1295400" cy="274659"/>
+            </a:xfrm>
+            <a:prstGeom prst="round2SameRect">
+              <a:avLst/>
+            </a:prstGeom>
+            <a:solidFill>
+              <a:srgbClr val="04617B"/>
+            </a:solidFill>
+            <a:ln w="9525" cap="flat" cmpd="sng" algn="ctr">
+              <a:noFill/>
+              <a:prstDash val="solid"/>
+              <a:round/>
+              <a:headEnd type="none" w="med" len="med"/>
+              <a:tailEnd type="none" w="med" len="med"/>
+            </a:ln>
+            <a:effectLst/>
+          </p:spPr>
+          <p:txBody>
+            <a:bodyPr tIns="0" bIns="46800">
+              <a:spAutoFit/>
+            </a:bodyPr>
+            <a:lstStyle/>
+            <a:p>
+              <a:pPr>
+                <a:defRPr/>
+              </a:pPr>
+              <a:r>
+                <a:rPr lang="en-US" sz="1400" b="1" dirty="0">
+                  <a:solidFill>
+                    <a:schemeClr val="bg1"/>
+                  </a:solidFill>
+                  <a:ea typeface="Arial" charset="0"/>
+                  <a:cs typeface="Arial" charset="0"/>
+                </a:rPr>
+                <a:t>Document</a:t>
+              </a:r>
+            </a:p>
+          </p:txBody>
+        </p:sp>
+      </p:grpSp>
+    </p:spTree>
+    <p:extLst>
+      <p:ext uri="{BB962C8B-B14F-4D97-AF65-F5344CB8AC3E}">
+        <p14:creationId xmlns:p14="http://schemas.microsoft.com/office/powerpoint/2010/main" val="1509020834"/>
+      </p:ext>
+    </p:extLst>
+  </p:cSld>
+  <p:clrMapOvr>
+    <a:masterClrMapping/>
+  </p:clrMapOvr>
+  <p:timing>
+    <p:tnLst>
+      <p:par>
+        <p:cTn xmlns:p14="http://schemas.microsoft.com/office/powerpoint/2010/main" id="1" dur="indefinite" restart="never" nodeType="tmRoot"/>
+      </p:par>
+    </p:tnLst>
+  </p:timing>
+</p:sld>
+</file>
+
+<file path=ppt/slides/slide6.xml><?xml version="1.0" encoding="utf-8"?>
+<p:sld xmlns:a="http://schemas.openxmlformats.org/drawingml/2006/main" xmlns:r="http://schemas.openxmlformats.org/officeDocument/2006/relationships" xmlns:p="http://schemas.openxmlformats.org/presentationml/2006/main">
+  <p:cSld>
+    <p:spTree>
+      <p:nvGrpSpPr>
+        <p:cNvPr id="1" name=""/>
+        <p:cNvGrpSpPr/>
+        <p:nvPr/>
+      </p:nvGrpSpPr>
+      <p:grpSpPr>
+        <a:xfrm>
+          <a:off x="0" y="0"/>
+          <a:ext cx="0" cy="0"/>
+          <a:chOff x="0" y="0"/>
+          <a:chExt cx="0" cy="0"/>
+        </a:xfrm>
+      </p:grpSpPr>
+      <p:sp>
+        <p:nvSpPr>
+          <p:cNvPr id="15362" name="Title 1"/>
+          <p:cNvSpPr>
+            <a:spLocks noGrp="1"/>
+          </p:cNvSpPr>
+          <p:nvPr>
+            <p:ph type="title"/>
+          </p:nvPr>
+        </p:nvSpPr>
+        <p:spPr/>
+        <p:txBody>
+          <a:bodyPr>
+            <a:normAutofit/>
+          </a:bodyPr>
+          <a:lstStyle/>
+          <a:p>
+            <a:r>
+              <a:rPr lang="en-CA" altLang="en-US" sz="3600" dirty="0" smtClean="0"/>
               <a:t>Requested action</a:t>
             </a:r>
           </a:p>
@@ -6718,7 +8115,7 @@
 </p:sld>
 </file>
 
-<file path=ppt/slides/slide6.xml><?xml version="1.0" encoding="utf-8"?>
+<file path=ppt/slides/slide7.xml><?xml version="1.0" encoding="utf-8"?>
 <p:sld xmlns:a="http://schemas.openxmlformats.org/drawingml/2006/main" xmlns:r="http://schemas.openxmlformats.org/officeDocument/2006/relationships" xmlns:p="http://schemas.openxmlformats.org/presentationml/2006/main">
   <p:cSld>
     <p:spTree>

</xml_diff>